<commit_message>
Added functionality of PPT Generation from URL and File Upload.
</commit_message>
<xml_diff>
--- a/data/output.pptx
+++ b/data/output.pptx
@@ -19,9 +19,6 @@
     <p:sldId id="267" r:id="rId18"/>
     <p:sldId id="268" r:id="rId19"/>
     <p:sldId id="269" r:id="rId20"/>
-    <p:sldId id="270" r:id="rId21"/>
-    <p:sldId id="271" r:id="rId22"/>
-    <p:sldId id="272" r:id="rId23"/>
   </p:sldIdLst>
   <p:sldSz cx="9144000" cy="6858000" type="screen4x3"/>
   <p:notesSz cx="6858000" cy="9144000"/>
@@ -3120,7 +3117,7 @@
           <a:lstStyle/>
           <a:p>
             <a:r>
-              <a:t>Introduction to Python Programming</a:t>
+              <a:t>1. Welcome to Python: The Language of the Future!</a:t>
             </a:r>
           </a:p>
         </p:txBody>
@@ -3141,19 +3138,19 @@
           <a:lstStyle/>
           <a:p>
             <a:r>
-              <a:t>Welcome to the World of Code!</a:t>
-            </a:r>
-          </a:p>
-          <a:p>
-            <a:pPr/>
-            <a:r>
-              <a:t>For 1st Year Computer Science Students</a:t>
-            </a:r>
-          </a:p>
-          <a:p>
-            <a:pPr/>
-            <a:r>
-              <a:t>Unlocking Your Programming Journey</a:t>
+              <a:t>Greetings, Future Innovators!</a:t>
+            </a:r>
+          </a:p>
+          <a:p>
+            <a:pPr/>
+            <a:r>
+              <a:t>This module introduces you to Python programming, a foundational skill for Computer Science.</a:t>
+            </a:r>
+          </a:p>
+          <a:p>
+            <a:pPr/>
+            <a:r>
+              <a:t>Our goal: Understand Python's core concepts, not just for exams, but for real-world problem-solving and interviews.</a:t>
             </a:r>
           </a:p>
         </p:txBody>
@@ -3192,7 +3189,7 @@
           <a:lstStyle/>
           <a:p>
             <a:r>
-              <a:t>Control Flow: Repeating Actions with Loops</a:t>
+              <a:t>10. Repeating Actions: Loops (for &amp; while)</a:t>
             </a:r>
           </a:p>
         </p:txBody>
@@ -3213,97 +3210,187 @@
           <a:lstStyle/>
           <a:p>
             <a:r>
-              <a:t>**Concept:** Allows your program to execute a block of code multiple times.</a:t>
-            </a:r>
-          </a:p>
-          <a:p>
-            <a:pPr/>
-            <a:r>
-              <a:t>**1. `for` Loop:** Iterates over a sequence (like a list, string, or range).</a:t>
-            </a:r>
-          </a:p>
-          <a:p>
-            <a:pPr/>
-            <a:r>
-              <a:t>  - **Syntax:** `for item in sequence: </a:t>
-            </a:r>
-            <a:br/>
-            <a:r>
-              <a:t>    # code to execute for each item`</a:t>
-            </a:r>
-          </a:p>
-          <a:p>
-            <a:pPr/>
-            <a:r>
-              <a:t>  - **`range()` function:** Generates a sequence of numbers (e.g., `range(5)` gives 0, 1, 2, 3, 4).</a:t>
-            </a:r>
-          </a:p>
-          <a:p>
-            <a:pPr/>
-            <a:r>
-              <a:t>  - **Example:** Printing each letter in a word.</a:t>
-            </a:r>
-          </a:p>
-          <a:p>
-            <a:pPr/>
-            <a:r>
-              <a:t>**2. `while` Loop:** Executes a block of code as long as a condition is `True`.</a:t>
-            </a:r>
-          </a:p>
-          <a:p>
-            <a:pPr/>
-            <a:r>
-              <a:t>  - **Syntax:** `while condition: </a:t>
-            </a:r>
-            <a:br/>
-            <a:r>
-              <a:t>    # code to execute repeatedly </a:t>
-            </a:r>
-            <a:br/>
-            <a:r>
-              <a:t>    # Must include a way to make condition False to avoid infinite loop`</a:t>
-            </a:r>
-          </a:p>
-          <a:p>
-            <a:pPr/>
-            <a:r>
-              <a:t>  - **Example:** Counting up to a number.</a:t>
-            </a:r>
-          </a:p>
-          <a:p>
-            <a:pPr/>
-            <a:r>
-              <a:t>**`break` and `continue`:**</a:t>
-            </a:r>
-          </a:p>
-          <a:p>
-            <a:pPr/>
-            <a:r>
-              <a:t>  - `break`: Exits the loop entirely.</a:t>
-            </a:r>
-          </a:p>
-          <a:p>
-            <a:pPr/>
-            <a:r>
-              <a:t>  - `continue`: Skips the rest of the current iteration and moves to the next.</a:t>
-            </a:r>
-          </a:p>
-          <a:p>
-            <a:pPr/>
-            <a:r>
-              <a:t>**Real-life Example:**</a:t>
-            </a:r>
-          </a:p>
-          <a:p>
-            <a:pPr/>
-            <a:r>
-              <a:t>  - `for` loop: Going through a shopping list item by item.</a:t>
-            </a:r>
-          </a:p>
-          <a:p>
-            <a:pPr/>
-            <a:r>
-              <a:t>  - `while` loop: Stirring a mixture "while it is still lumpy."</a:t>
+              <a:t>**Iteration (Theory):**</a:t>
+            </a:r>
+          </a:p>
+          <a:p>
+            <a:pPr/>
+            <a:r>
+              <a:t>   - The process of repeating a block of code multiple times.</a:t>
+            </a:r>
+          </a:p>
+          <a:p>
+            <a:pPr/>
+            <a:r>
+              <a:t>   - Loops are fundamental for automating repetitive tasks.</a:t>
+            </a:r>
+          </a:p>
+          <a:p>
+            <a:pPr/>
+            <a:r>
+              <a:t>**Real-life Analogy:**</a:t>
+            </a:r>
+          </a:p>
+          <a:p>
+            <a:pPr/>
+            <a:r>
+              <a:t>   - **`for` loop:** Following a recipe step-by-step for each cookie you bake (you know how many cookies you're making).</a:t>
+            </a:r>
+          </a:p>
+          <a:p>
+            <a:pPr/>
+            <a:r>
+              <a:t>   - **`while` loop:** Stirring a pot until the sauce thickens (you don't know exactly how many stirs, but you have a condition to stop).</a:t>
+            </a:r>
+          </a:p>
+          <a:p>
+            <a:pPr/>
+            <a:r>
+              <a:t>**1. The `for` Loop (Theory):**</a:t>
+            </a:r>
+          </a:p>
+          <a:p>
+            <a:pPr/>
+            <a:r>
+              <a:t>   - Used for iterating over a sequence (like a string, list, tuple, or `range`).</a:t>
+            </a:r>
+          </a:p>
+          <a:p>
+            <a:pPr/>
+            <a:r>
+              <a:t>   - Ideal when you know the number of iterations or are processing items in a collection.</a:t>
+            </a:r>
+          </a:p>
+          <a:p>
+            <a:pPr/>
+            <a:r>
+              <a:t>   - Syntax: `for item in sequence:`</a:t>
+            </a:r>
+          </a:p>
+          <a:p>
+            <a:pPr/>
+            <a:r>
+              <a:t>   - `range()` function: Generates a sequence of numbers (e.g., `range(5)` -&gt; `0, 1, 2, 3, 4`).</a:t>
+            </a:r>
+          </a:p>
+          <a:p>
+            <a:pPr/>
+            <a:r>
+              <a:t>**Textbook Example (`for`):**</a:t>
+            </a:r>
+          </a:p>
+          <a:p>
+            <a:pPr/>
+            <a:r>
+              <a:t>   `for i in range(3):`</a:t>
+            </a:r>
+          </a:p>
+          <a:p>
+            <a:pPr/>
+            <a:r>
+              <a:t>   `    print('Python is fun!')`</a:t>
+            </a:r>
+          </a:p>
+          <a:p>
+            <a:pPr/>
+            <a:r>
+              <a:t>   `# Output: Python is fun! (3 times)`</a:t>
+            </a:r>
+          </a:p>
+          <a:p>
+            <a:pPr/>
+            <a:r>
+              <a:t>   `my_fruits = ['apple', 'banana', 'cherry']`</a:t>
+            </a:r>
+          </a:p>
+          <a:p>
+            <a:pPr/>
+            <a:r>
+              <a:t>   `for fruit in my_fruits:`</a:t>
+            </a:r>
+          </a:p>
+          <a:p>
+            <a:pPr/>
+            <a:r>
+              <a:t>   `    print(fruit)`</a:t>
+            </a:r>
+          </a:p>
+          <a:p>
+            <a:pPr/>
+            <a:r>
+              <a:t>**2. The `while` Loop (Theory):**</a:t>
+            </a:r>
+          </a:p>
+          <a:p>
+            <a:pPr/>
+            <a:r>
+              <a:t>   - Executes a block of code as long as a condition is `True`.</a:t>
+            </a:r>
+          </a:p>
+          <a:p>
+            <a:pPr/>
+            <a:r>
+              <a:t>   - Ideal when the number of iterations is unknown, and it depends on a condition being met.</a:t>
+            </a:r>
+          </a:p>
+          <a:p>
+            <a:pPr/>
+            <a:r>
+              <a:t>   - Syntax: `while condition:`</a:t>
+            </a:r>
+          </a:p>
+          <a:p>
+            <a:pPr/>
+            <a:r>
+              <a:t>**Textbook Example (`while`):**</a:t>
+            </a:r>
+          </a:p>
+          <a:p>
+            <a:pPr/>
+            <a:r>
+              <a:t>   `count = 0`</a:t>
+            </a:r>
+          </a:p>
+          <a:p>
+            <a:pPr/>
+            <a:r>
+              <a:t>   `while count &lt; 3:`</a:t>
+            </a:r>
+          </a:p>
+          <a:p>
+            <a:pPr/>
+            <a:r>
+              <a:t>   `    print(f'Count is: {count}')`</a:t>
+            </a:r>
+          </a:p>
+          <a:p>
+            <a:pPr/>
+            <a:r>
+              <a:t>   `    count += 1`</a:t>
+            </a:r>
+          </a:p>
+          <a:p>
+            <a:pPr/>
+            <a:r>
+              <a:t>   `# Output: Count is: 0, Count is: 1, Count is: 2`</a:t>
+            </a:r>
+          </a:p>
+          <a:p>
+            <a:pPr/>
+            <a:r>
+              <a:t>**Story Problem:**</a:t>
+            </a:r>
+          </a:p>
+          <a:p>
+            <a:pPr/>
+            <a:r>
+              <a:t>   - A game needs to simulate counting down from 5 to 1 before launching a rocket. Use a `while` loop for this.</a:t>
+            </a:r>
+          </a:p>
+          <a:p>
+            <a:pPr/>
+            <a:r>
+              <a:t>   - You have a list of student names. Use a `for` loop to print each student's name with a greeting.</a:t>
             </a:r>
           </a:p>
         </p:txBody>
@@ -3342,7 +3429,7 @@
           <a:lstStyle/>
           <a:p>
             <a:r>
-              <a:t>Data Structures: Lists - Ordered Collections</a:t>
+              <a:t>11. Organizing Data: Lists &amp; Tuples (An Introduction)</a:t>
             </a:r>
           </a:p>
         </p:txBody>
@@ -3363,91 +3450,139 @@
           <a:lstStyle/>
           <a:p>
             <a:r>
-              <a:t>**Definition:** An ordered, mutable (changeable) collection of items.</a:t>
-            </a:r>
-          </a:p>
-          <a:p>
-            <a:pPr/>
-            <a:r>
-              <a:t>**Creation:** Enclosed in square brackets `[]`, items separated by commas.</a:t>
-            </a:r>
-          </a:p>
-          <a:p>
-            <a:pPr/>
-            <a:r>
-              <a:t>  - `my_list = [1, "hello", 3.14, True]`</a:t>
-            </a:r>
-          </a:p>
-          <a:p>
-            <a:pPr/>
-            <a:r>
-              <a:t>**Characteristics:**</a:t>
-            </a:r>
-          </a:p>
-          <a:p>
-            <a:pPr/>
-            <a:r>
-              <a:t>  - **Ordered:** Items have a defined order, which won't change.</a:t>
-            </a:r>
-          </a:p>
-          <a:p>
-            <a:pPr/>
-            <a:r>
-              <a:t>  - **Mutable:** You can add, remove, or change items after creation.</a:t>
-            </a:r>
-          </a:p>
-          <a:p>
-            <a:pPr/>
-            <a:r>
-              <a:t>  - **Allows Duplicates:** Can contain multiple identical items.</a:t>
-            </a:r>
-          </a:p>
-          <a:p>
-            <a:pPr/>
-            <a:r>
-              <a:t>  - **Heterogeneous:** Can store items of different data types.</a:t>
-            </a:r>
-          </a:p>
-          <a:p>
-            <a:pPr/>
-            <a:r>
-              <a:t>**Common Operations:**</a:t>
-            </a:r>
-          </a:p>
-          <a:p>
-            <a:pPr/>
-            <a:r>
-              <a:t>  - **Accessing items:** `my_list[index]` (indexing starts at 0).</a:t>
-            </a:r>
-          </a:p>
-          <a:p>
-            <a:pPr/>
-            <a:r>
-              <a:t>  - **Slicing:** `my_list[start:end]`</a:t>
-            </a:r>
-          </a:p>
-          <a:p>
-            <a:pPr/>
-            <a:r>
-              <a:t>  - **Adding items:** `append()`, `insert()`</a:t>
-            </a:r>
-          </a:p>
-          <a:p>
-            <a:pPr/>
-            <a:r>
-              <a:t>  - **Removing items:** `remove()`, `pop()`</a:t>
-            </a:r>
-          </a:p>
-          <a:p>
-            <a:pPr/>
-            <a:r>
-              <a:t>  - **Length:** `len(my_list)`</a:t>
-            </a:r>
-          </a:p>
-          <a:p>
-            <a:pPr/>
-            <a:r>
-              <a:t>**Real-life Analogy:** A shopping list where you can add, cross out, and reorder items.</a:t>
+              <a:t>**Collections (Theory):**</a:t>
+            </a:r>
+          </a:p>
+          <a:p>
+            <a:pPr/>
+            <a:r>
+              <a:t>   - Data structures that allow you to store multiple values in a single variable.</a:t>
+            </a:r>
+          </a:p>
+          <a:p>
+            <a:pPr/>
+            <a:r>
+              <a:t>**Real-life Analogy:**</a:t>
+            </a:r>
+          </a:p>
+          <a:p>
+            <a:pPr/>
+            <a:r>
+              <a:t>   - Think of a shopping list (list) where you can add or remove items, versus a recipe's ingredients (tuple) which usually don't change once decided.</a:t>
+            </a:r>
+          </a:p>
+          <a:p>
+            <a:pPr/>
+            <a:r>
+              <a:t>**1. Lists (Theory):**</a:t>
+            </a:r>
+          </a:p>
+          <a:p>
+            <a:pPr/>
+            <a:r>
+              <a:t>   - Ordered, changeable (mutable) collections of items.</a:t>
+            </a:r>
+          </a:p>
+          <a:p>
+            <a:pPr/>
+            <a:r>
+              <a:t>   - Items can be of different data types.</a:t>
+            </a:r>
+          </a:p>
+          <a:p>
+            <a:pPr/>
+            <a:r>
+              <a:t>   - Defined using square brackets `[]`.</a:t>
+            </a:r>
+          </a:p>
+          <a:p>
+            <a:pPr/>
+            <a:r>
+              <a:t>**Textbook Example (List):**</a:t>
+            </a:r>
+          </a:p>
+          <a:p>
+            <a:pPr/>
+            <a:r>
+              <a:t>   `my_list = ['apple', 'banana', 10, True]`</a:t>
+            </a:r>
+          </a:p>
+          <a:p>
+            <a:pPr/>
+            <a:r>
+              <a:t>   `print(my_list[0])`  # Access item by index (starts from 0)</a:t>
+            </a:r>
+          </a:p>
+          <a:p>
+            <a:pPr/>
+            <a:r>
+              <a:t>   `my_list.append('cherry')`  # Add an item</a:t>
+            </a:r>
+          </a:p>
+          <a:p>
+            <a:pPr/>
+            <a:r>
+              <a:t>   `my_list[1] = 'orange'`   # Change an item</a:t>
+            </a:r>
+          </a:p>
+          <a:p>
+            <a:pPr/>
+            <a:r>
+              <a:t>**2. Tuples (Theory):**</a:t>
+            </a:r>
+          </a:p>
+          <a:p>
+            <a:pPr/>
+            <a:r>
+              <a:t>   - Ordered, unchangeable (immutable) collections of items.</a:t>
+            </a:r>
+          </a:p>
+          <a:p>
+            <a:pPr/>
+            <a:r>
+              <a:t>   - Defined using parentheses `()`.</a:t>
+            </a:r>
+          </a:p>
+          <a:p>
+            <a:pPr/>
+            <a:r>
+              <a:t>   - Often used for fixed collections of items or as return values from functions.</a:t>
+            </a:r>
+          </a:p>
+          <a:p>
+            <a:pPr/>
+            <a:r>
+              <a:t>**Textbook Example (Tuple):**</a:t>
+            </a:r>
+          </a:p>
+          <a:p>
+            <a:pPr/>
+            <a:r>
+              <a:t>   `my_tuple = ('red', 'green', 'blue')`</a:t>
+            </a:r>
+          </a:p>
+          <a:p>
+            <a:pPr/>
+            <a:r>
+              <a:t>   `print(my_tuple[1])`</a:t>
+            </a:r>
+          </a:p>
+          <a:p>
+            <a:pPr/>
+            <a:r>
+              <a:t>   `# my_tuple[0] = 'yellow'` # This would cause an error (immutable!)</a:t>
+            </a:r>
+          </a:p>
+          <a:p>
+            <a:pPr/>
+            <a:r>
+              <a:t>**Story Problem:**</a:t>
+            </a:r>
+          </a:p>
+          <a:p>
+            <a:pPr/>
+            <a:r>
+              <a:t>   - You are tracking the daily temperatures for a week. Which data structure (list or tuple) would be more appropriate if you might need to update a temperature later? Why? Show an example of storing and accessing temperatures.</a:t>
             </a:r>
           </a:p>
         </p:txBody>
@@ -3486,7 +3621,7 @@
           <a:lstStyle/>
           <a:p>
             <a:r>
-              <a:t>Data Structures: Tuples - Immutable Sequences</a:t>
+              <a:t>12. Building Blocks: Functions</a:t>
             </a:r>
           </a:p>
         </p:txBody>
@@ -3507,97 +3642,139 @@
           <a:lstStyle/>
           <a:p>
             <a:r>
-              <a:t>**Definition:** An ordered, immutable (unchangeable) collection of items.</a:t>
-            </a:r>
-          </a:p>
-          <a:p>
-            <a:pPr/>
-            <a:r>
-              <a:t>**Creation:** Enclosed in parentheses `()`, items separated by commas.</a:t>
-            </a:r>
-          </a:p>
-          <a:p>
-            <a:pPr/>
-            <a:r>
-              <a:t>  - `my_tuple = (1, "world", 3.14)`</a:t>
-            </a:r>
-          </a:p>
-          <a:p>
-            <a:pPr/>
-            <a:r>
-              <a:t>**Characteristics:**</a:t>
-            </a:r>
-          </a:p>
-          <a:p>
-            <a:pPr/>
-            <a:r>
-              <a:t>  - **Ordered:** Similar to lists, items have a defined order.</a:t>
-            </a:r>
-          </a:p>
-          <a:p>
-            <a:pPr/>
-            <a:r>
-              <a:t>  - **Immutable:** Once created, you cannot change, add, or remove items.</a:t>
-            </a:r>
-          </a:p>
-          <a:p>
-            <a:pPr/>
-            <a:r>
-              <a:t>  - **Allows Duplicates &amp; Heterogeneous:** Similar to lists.</a:t>
-            </a:r>
-          </a:p>
-          <a:p>
-            <a:pPr/>
-            <a:r>
-              <a:t>**Why use Tuples?**</a:t>
-            </a:r>
-          </a:p>
-          <a:p>
-            <a:pPr/>
-            <a:r>
-              <a:t>  - **Data Integrity:** Guarantees that the data won't change accidentally.</a:t>
-            </a:r>
-          </a:p>
-          <a:p>
-            <a:pPr/>
-            <a:r>
-              <a:t>  - **Faster:** Slightly faster than lists for iteration.</a:t>
-            </a:r>
-          </a:p>
-          <a:p>
-            <a:pPr/>
-            <a:r>
-              <a:t>  - **Used as Dictionary Keys:** Because they are immutable.</a:t>
-            </a:r>
-          </a:p>
-          <a:p>
-            <a:pPr/>
-            <a:r>
-              <a:t>**Common Operations:**</a:t>
-            </a:r>
-          </a:p>
-          <a:p>
-            <a:pPr/>
-            <a:r>
-              <a:t>  - **Accessing items:** `my_tuple[index]`</a:t>
-            </a:r>
-          </a:p>
-          <a:p>
-            <a:pPr/>
-            <a:r>
-              <a:t>  - **Slicing:** `my_tuple[start:end]`</a:t>
-            </a:r>
-          </a:p>
-          <a:p>
-            <a:pPr/>
-            <a:r>
-              <a:t>  - **Length:** `len(my_tuple)`</a:t>
-            </a:r>
-          </a:p>
-          <a:p>
-            <a:pPr/>
-            <a:r>
-              <a:t>**Real-life Analogy:** A fixed address (street number, street name, city) – its components don't change once assigned.</a:t>
+              <a:t>**What are Functions? (Theory):**</a:t>
+            </a:r>
+          </a:p>
+          <a:p>
+            <a:pPr/>
+            <a:r>
+              <a:t>   - Blocks of organized, reusable code that perform a single, related action.</a:t>
+            </a:r>
+          </a:p>
+          <a:p>
+            <a:pPr/>
+            <a:r>
+              <a:t>   - They allow you to break down complex problems into smaller, manageable parts.</a:t>
+            </a:r>
+          </a:p>
+          <a:p>
+            <a:pPr/>
+            <a:r>
+              <a:t>**Real-life Analogy:**</a:t>
+            </a:r>
+          </a:p>
+          <a:p>
+            <a:pPr/>
+            <a:r>
+              <a:t>   - A function is like a specialized machine in a factory. You give it specific materials (inputs), it does its job, and sometimes gives you a finished product (output). You don't need to know *how* the machine works internally, just how to use it.</a:t>
+            </a:r>
+          </a:p>
+          <a:p>
+            <a:pPr/>
+            <a:r>
+              <a:t>**Defining a Function (Theory):**</a:t>
+            </a:r>
+          </a:p>
+          <a:p>
+            <a:pPr/>
+            <a:r>
+              <a:t>   - Keyword `def` followed by function name, parentheses `()`, and a colon `:`. </a:t>
+            </a:r>
+          </a:p>
+          <a:p>
+            <a:pPr/>
+            <a:r>
+              <a:t>   - Parameters (inputs) go inside the parentheses.</a:t>
+            </a:r>
+          </a:p>
+          <a:p>
+            <a:pPr/>
+            <a:r>
+              <a:t>   - The `return` statement sends a value back as the function's output.</a:t>
+            </a:r>
+          </a:p>
+          <a:p>
+            <a:pPr/>
+            <a:r>
+              <a:t>**Syntax (Textbook Example):**</a:t>
+            </a:r>
+          </a:p>
+          <a:p>
+            <a:pPr/>
+            <a:r>
+              <a:t>   `def greet(name):`</a:t>
+            </a:r>
+          </a:p>
+          <a:p>
+            <a:pPr/>
+            <a:r>
+              <a:t>   `    '''This function greets the person passed in as a parameter.'''`</a:t>
+            </a:r>
+          </a:p>
+          <a:p>
+            <a:pPr/>
+            <a:r>
+              <a:t>   `    print(f'Hello, {name}!')`</a:t>
+            </a:r>
+          </a:p>
+          <a:p>
+            <a:pPr/>
+            <a:r>
+              <a:t>   `def add_numbers(a, b):`</a:t>
+            </a:r>
+          </a:p>
+          <a:p>
+            <a:pPr/>
+            <a:r>
+              <a:t>   `    return a + b`</a:t>
+            </a:r>
+          </a:p>
+          <a:p>
+            <a:pPr/>
+            <a:r>
+              <a:t>**Calling a Function (Theory):**</a:t>
+            </a:r>
+          </a:p>
+          <a:p>
+            <a:pPr/>
+            <a:r>
+              <a:t>   - Using the function's name followed by parentheses, passing arguments (actual values for parameters).</a:t>
+            </a:r>
+          </a:p>
+          <a:p>
+            <a:pPr/>
+            <a:r>
+              <a:t>**Textbook Example (Calling):**</a:t>
+            </a:r>
+          </a:p>
+          <a:p>
+            <a:pPr/>
+            <a:r>
+              <a:t>   `greet('Alice')`</a:t>
+            </a:r>
+          </a:p>
+          <a:p>
+            <a:pPr/>
+            <a:r>
+              <a:t>   `result = add_numbers(10, 5)`</a:t>
+            </a:r>
+          </a:p>
+          <a:p>
+            <a:pPr/>
+            <a:r>
+              <a:t>   `print(f'Sum: {result}')`</a:t>
+            </a:r>
+          </a:p>
+          <a:p>
+            <a:pPr/>
+            <a:r>
+              <a:t>**Story Problem:**</a:t>
+            </a:r>
+          </a:p>
+          <a:p>
+            <a:pPr/>
+            <a:r>
+              <a:t>   - Create a function called `calculate_area_rectangle` that takes `length` and `width` as parameters and returns their product. Then, use this function to calculate the area of a room that is 12 units long and 8 units wide, and print the result.</a:t>
             </a:r>
           </a:p>
         </p:txBody>
@@ -3636,7 +3813,7 @@
           <a:lstStyle/>
           <a:p>
             <a:r>
-              <a:t>Data Structures: Dictionaries - Key-Value Pairs</a:t>
+              <a:t>13. Making Code Readable: Comments</a:t>
             </a:r>
           </a:p>
         </p:txBody>
@@ -3657,79 +3834,103 @@
           <a:lstStyle/>
           <a:p>
             <a:r>
-              <a:t>**Definition:** An unordered, mutable collection of data items stored as key-value pairs.</a:t>
-            </a:r>
-          </a:p>
-          <a:p>
-            <a:pPr/>
-            <a:r>
-              <a:t>**Creation:** Enclosed in curly braces `{}`, with `key: value` pairs.</a:t>
-            </a:r>
-          </a:p>
-          <a:p>
-            <a:pPr/>
-            <a:r>
-              <a:t>  - `my_dict = {"name": "Alice", "age": 30, "city": "New York"}`</a:t>
-            </a:r>
-          </a:p>
-          <a:p>
-            <a:pPr/>
-            <a:r>
-              <a:t>**Characteristics:**</a:t>
-            </a:r>
-          </a:p>
-          <a:p>
-            <a:pPr/>
-            <a:r>
-              <a:t>  - **Unordered (in Python &lt; 3.7):** Order is insertion-ordered (Python 3.7+).</a:t>
-            </a:r>
-          </a:p>
-          <a:p>
-            <a:pPr/>
-            <a:r>
-              <a:t>  - **Mutable:** You can add, remove, or change key-value pairs.</a:t>
-            </a:r>
-          </a:p>
-          <a:p>
-            <a:pPr/>
-            <a:r>
-              <a:t>  - **Keys must be Unique &amp; Immutable:** (e.g., strings, numbers, tuples). Values can be anything.</a:t>
-            </a:r>
-          </a:p>
-          <a:p>
-            <a:pPr/>
-            <a:r>
-              <a:t>**Common Operations:**</a:t>
-            </a:r>
-          </a:p>
-          <a:p>
-            <a:pPr/>
-            <a:r>
-              <a:t>  - **Accessing values:** `my_dict["key"]`</a:t>
-            </a:r>
-          </a:p>
-          <a:p>
-            <a:pPr/>
-            <a:r>
-              <a:t>  - **Adding/Updating:** `my_dict["new_key"] = "new_value"`</a:t>
-            </a:r>
-          </a:p>
-          <a:p>
-            <a:pPr/>
-            <a:r>
-              <a:t>  - **Removing:** `del my_dict["key"]`, `pop("key")`</a:t>
-            </a:r>
-          </a:p>
-          <a:p>
-            <a:pPr/>
-            <a:r>
-              <a:t>  - **Getting all keys/values:** `my_dict.keys()`, `my_dict.values()`</a:t>
-            </a:r>
-          </a:p>
-          <a:p>
-            <a:pPr/>
-            <a:r>
-              <a:t>**Real-life Analogy:** A physical dictionary where you look up a "word" (key) to find its "definition" (value).</a:t>
+              <a:t>**What are Comments? (Theory):**</a:t>
+            </a:r>
+          </a:p>
+          <a:p>
+            <a:pPr/>
+            <a:r>
+              <a:t>   - Lines in the code that are ignored by the Python interpreter.</a:t>
+            </a:r>
+          </a:p>
+          <a:p>
+            <a:pPr/>
+            <a:r>
+              <a:t>   - Used to explain the code, making it easier for humans (you and others) to understand.</a:t>
+            </a:r>
+          </a:p>
+          <a:p>
+            <a:pPr/>
+            <a:r>
+              <a:t>**Real-life Analogy:**</a:t>
+            </a:r>
+          </a:p>
+          <a:p>
+            <a:pPr/>
+            <a:r>
+              <a:t>   - Comments are like notes in a textbook or instructions on a map. They don't change the content, but they make it much clearer and easier to follow.</a:t>
+            </a:r>
+          </a:p>
+          <a:p>
+            <a:pPr/>
+            <a:r>
+              <a:t>**Types of Comments (Theory &amp; Examples):**</a:t>
+            </a:r>
+          </a:p>
+          <a:p>
+            <a:pPr/>
+            <a:r>
+              <a:t>   1. **Single-line Comments:** Start with a `#`.</a:t>
+            </a:r>
+          </a:p>
+          <a:p>
+            <a:pPr/>
+            <a:r>
+              <a:t>      - `print('Hello')  # This prints a greeting.`</a:t>
+            </a:r>
+          </a:p>
+          <a:p>
+            <a:pPr/>
+            <a:r>
+              <a:t>   2. **Multi-line Comments (Docstrings):** Enclosed in triple quotes (`'''` or `"""`). Often used for function/module documentation.</a:t>
+            </a:r>
+          </a:p>
+          <a:p>
+            <a:pPr/>
+            <a:r>
+              <a:t>      - `'''This is a multi-line comment.`</a:t>
+            </a:r>
+          </a:p>
+          <a:p>
+            <a:pPr/>
+            <a:r>
+              <a:t>      `It explains a block of code.`</a:t>
+            </a:r>
+          </a:p>
+          <a:p>
+            <a:pPr/>
+            <a:r>
+              <a:t>      `It's also used for documentation.'''`</a:t>
+            </a:r>
+          </a:p>
+          <a:p>
+            <a:pPr/>
+            <a:r>
+              <a:t>**Why are Comments Important? (Interview Aspect):**</a:t>
+            </a:r>
+          </a:p>
+          <a:p>
+            <a:pPr/>
+            <a:r>
+              <a:t>   - **Clarity:** Explains complex logic.</a:t>
+            </a:r>
+          </a:p>
+          <a:p>
+            <a:pPr/>
+            <a:r>
+              <a:t>   - **Maintenance:** Helps you (or others) understand old code later.</a:t>
+            </a:r>
+          </a:p>
+          <a:p>
+            <a:pPr/>
+            <a:r>
+              <a:t>   - **Collaboration:** Essential when working in teams.</a:t>
+            </a:r>
+          </a:p>
+          <a:p>
+            <a:pPr/>
+            <a:r>
+              <a:t>   - **Debugging:** Can temporarily disable code for testing.</a:t>
             </a:r>
           </a:p>
         </p:txBody>
@@ -3768,7 +3969,7 @@
           <a:lstStyle/>
           <a:p>
             <a:r>
-              <a:t>Functions: Reusable Code Blocks</a:t>
+              <a:t>14. Key Takeaways &amp; Next Steps</a:t>
             </a:r>
           </a:p>
         </p:txBody>
@@ -3789,447 +3990,97 @@
           <a:lstStyle/>
           <a:p>
             <a:r>
-              <a:t>**Concept:** A block of organized, reusable code that performs a single, related action.</a:t>
-            </a:r>
-          </a:p>
-          <a:p>
-            <a:pPr/>
-            <a:r>
-              <a:t>**Why use Functions?**</a:t>
-            </a:r>
-          </a:p>
-          <a:p>
-            <a:pPr/>
-            <a:r>
-              <a:t>  - **Modularity:** Break down complex problems into smaller, manageable parts.</a:t>
-            </a:r>
-          </a:p>
-          <a:p>
-            <a:pPr/>
-            <a:r>
-              <a:t>  - **Reusability:** Write code once and use it multiple times.</a:t>
-            </a:r>
-          </a:p>
-          <a:p>
-            <a:pPr/>
-            <a:r>
-              <a:t>  - **Readability:** Makes your code easier to understand and maintain.</a:t>
-            </a:r>
-          </a:p>
-          <a:p>
-            <a:pPr/>
-            <a:r>
-              <a:t>  - **Avoid Repetition (DRY - Don't Repeat Yourself).**</a:t>
-            </a:r>
-          </a:p>
-          <a:p>
-            <a:pPr/>
-            <a:r>
-              <a:t>**Defining a Function:**</a:t>
-            </a:r>
-          </a:p>
-          <a:p>
-            <a:pPr/>
-            <a:r>
-              <a:t>  - **Syntax:** `def function_name(parameters): </a:t>
-            </a:r>
-            <a:br/>
-            <a:r>
-              <a:t>    # code block </a:t>
-            </a:r>
-            <a:br/>
-            <a:r>
-              <a:t>    return result # Optional`</a:t>
-            </a:r>
-          </a:p>
-          <a:p>
-            <a:pPr/>
-            <a:r>
-              <a:t>  - `def` keyword, function name, parentheses for parameters, colon.</a:t>
-            </a:r>
-          </a:p>
-          <a:p>
-            <a:pPr/>
-            <a:r>
-              <a:t>**Calling a Function:** `function_name(arguments)`</a:t>
-            </a:r>
-          </a:p>
-          <a:p>
-            <a:pPr/>
-            <a:r>
-              <a:t>**Parameters &amp; Arguments:**</a:t>
-            </a:r>
-          </a:p>
-          <a:p>
-            <a:pPr/>
-            <a:r>
-              <a:t>  - **Parameters:** Variables listed inside the parentheses in the function definition.</a:t>
-            </a:r>
-          </a:p>
-          <a:p>
-            <a:pPr/>
-            <a:r>
-              <a:t>  - **Arguments:** Actual values passed to the function when it's called.</a:t>
-            </a:r>
-          </a:p>
-          <a:p>
-            <a:pPr/>
-            <a:r>
-              <a:t>**`return` Statement:** Sends a value back from the function.</a:t>
-            </a:r>
-          </a:p>
-          <a:p>
-            <a:pPr/>
-            <a:r>
-              <a:t>**Real-life Analogy:** A recipe. You define the steps (function) once, and you can "call" it (cook the dish) whenever you need it.</a:t>
-            </a:r>
-          </a:p>
-        </p:txBody>
-      </p:sp>
-    </p:spTree>
-  </p:cSld>
-  <p:clrMapOvr>
-    <a:masterClrMapping/>
-  </p:clrMapOvr>
-</p:sld>
-</file>
-
-<file path=ppt/slides/slide15.xml><?xml version="1.0" encoding="utf-8"?>
-<p:sld xmlns:a="http://schemas.openxmlformats.org/drawingml/2006/main" xmlns:p="http://schemas.openxmlformats.org/presentationml/2006/main" xmlns:r="http://schemas.openxmlformats.org/officeDocument/2006/relationships">
-  <p:cSld>
-    <p:spTree>
-      <p:nvGrpSpPr>
-        <p:cNvPr id="1" name=""/>
-        <p:cNvGrpSpPr/>
-        <p:nvPr/>
-      </p:nvGrpSpPr>
-      <p:grpSpPr/>
-      <p:sp>
-        <p:nvSpPr>
-          <p:cNvPr id="2" name="Title 1"/>
-          <p:cNvSpPr>
-            <a:spLocks noGrp="1"/>
-          </p:cNvSpPr>
-          <p:nvPr>
-            <p:ph type="title"/>
-          </p:nvPr>
-        </p:nvSpPr>
-        <p:spPr/>
-        <p:txBody>
-          <a:bodyPr/>
-          <a:lstStyle/>
-          <a:p>
-            <a:r>
-              <a:t>Modules &amp; Packages: Organizing Your Python Code</a:t>
-            </a:r>
-          </a:p>
-        </p:txBody>
-      </p:sp>
-      <p:sp>
-        <p:nvSpPr>
-          <p:cNvPr id="3" name="Content Placeholder 2"/>
-          <p:cNvSpPr>
-            <a:spLocks noGrp="1"/>
-          </p:cNvSpPr>
-          <p:nvPr>
-            <p:ph idx="1"/>
-          </p:nvPr>
-        </p:nvSpPr>
-        <p:spPr/>
-        <p:txBody>
-          <a:bodyPr/>
-          <a:lstStyle/>
-          <a:p>
-            <a:r>
-              <a:t>**Concept:** Ways to structure your code for better organization, reusability, and maintainability.</a:t>
-            </a:r>
-          </a:p>
-          <a:p>
-            <a:pPr/>
-            <a:r>
-              <a:t>**Module:**</a:t>
-            </a:r>
-          </a:p>
-          <a:p>
-            <a:pPr/>
-            <a:r>
-              <a:t>  - **Definition:** A single Python file (`.py`) containing Python definitions and statements.</a:t>
-            </a:r>
-          </a:p>
-          <a:p>
-            <a:pPr/>
-            <a:r>
-              <a:t>  - **Purpose:** Groups related functions, classes, and variables.</a:t>
-            </a:r>
-          </a:p>
-          <a:p>
-            <a:pPr/>
-            <a:r>
-              <a:t>  - **Importing:** Use the `import` statement to bring a module's contents into your current script.</a:t>
-            </a:r>
-          </a:p>
-          <a:p>
-            <a:pPr/>
-            <a:r>
-              <a:t>    - `import math` (then use `math.sqrt()`)</a:t>
-            </a:r>
-          </a:p>
-          <a:p>
-            <a:pPr/>
-            <a:r>
-              <a:t>    - `from math import sqrt` (then use `sqrt()`)</a:t>
-            </a:r>
-          </a:p>
-          <a:p>
-            <a:pPr/>
-            <a:r>
-              <a:t>  - **Real-life Analogy:** A specific tool kit (e.g., a "math kit" with a calculator, ruler).</a:t>
-            </a:r>
-          </a:p>
-          <a:p>
-            <a:pPr/>
-            <a:r>
-              <a:t>**Package:**</a:t>
-            </a:r>
-          </a:p>
-          <a:p>
-            <a:pPr/>
-            <a:r>
-              <a:t>  - **Definition:** A collection of modules in directories, providing a structured hierarchy.</a:t>
-            </a:r>
-          </a:p>
-          <a:p>
-            <a:pPr/>
-            <a:r>
-              <a:t>  - **Purpose:** Organizes related modules into a single unit.</a:t>
-            </a:r>
-          </a:p>
-          <a:p>
-            <a:pPr/>
-            <a:r>
-              <a:t>  - **Structure:** A directory containing a special `__init__.py` file (can be empty) and other module files/sub-packages.</a:t>
-            </a:r>
-          </a:p>
-          <a:p>
-            <a:pPr/>
-            <a:r>
-              <a:t>  - **Importing:** `import package_name.module_name`</a:t>
-            </a:r>
-          </a:p>
-          <a:p>
-            <a:pPr/>
-            <a:r>
-              <a:t>  - **Real-life Analogy:** A whole toolbox, containing multiple tool kits (modules).</a:t>
-            </a:r>
-          </a:p>
-          <a:p>
-            <a:pPr/>
-            <a:r>
-              <a:t>**Benefits:** Code reuse, namespace management, easier collaboration.</a:t>
-            </a:r>
-          </a:p>
-        </p:txBody>
-      </p:sp>
-    </p:spTree>
-  </p:cSld>
-  <p:clrMapOvr>
-    <a:masterClrMapping/>
-  </p:clrMapOvr>
-</p:sld>
-</file>
-
-<file path=ppt/slides/slide16.xml><?xml version="1.0" encoding="utf-8"?>
-<p:sld xmlns:a="http://schemas.openxmlformats.org/drawingml/2006/main" xmlns:p="http://schemas.openxmlformats.org/presentationml/2006/main" xmlns:r="http://schemas.openxmlformats.org/officeDocument/2006/relationships">
-  <p:cSld>
-    <p:spTree>
-      <p:nvGrpSpPr>
-        <p:cNvPr id="1" name=""/>
-        <p:cNvGrpSpPr/>
-        <p:nvPr/>
-      </p:nvGrpSpPr>
-      <p:grpSpPr/>
-      <p:sp>
-        <p:nvSpPr>
-          <p:cNvPr id="2" name="Title 1"/>
-          <p:cNvSpPr>
-            <a:spLocks noGrp="1"/>
-          </p:cNvSpPr>
-          <p:nvPr>
-            <p:ph type="title"/>
-          </p:nvPr>
-        </p:nvSpPr>
-        <p:spPr/>
-        <p:txBody>
-          <a:bodyPr/>
-          <a:lstStyle/>
-          <a:p>
-            <a:r>
-              <a:t>Real-world Applications of Python - Where You'll See It</a:t>
-            </a:r>
-          </a:p>
-        </p:txBody>
-      </p:sp>
-      <p:sp>
-        <p:nvSpPr>
-          <p:cNvPr id="3" name="Content Placeholder 2"/>
-          <p:cNvSpPr>
-            <a:spLocks noGrp="1"/>
-          </p:cNvSpPr>
-          <p:nvPr>
-            <p:ph idx="1"/>
-          </p:nvPr>
-        </p:nvSpPr>
-        <p:spPr/>
-        <p:txBody>
-          <a:bodyPr/>
-          <a:lstStyle/>
-          <a:p>
-            <a:r>
-              <a:t>**Web Development:** Backend for web apps (Django, Flask), APIs. (e.g., Instagram, Spotify)</a:t>
-            </a:r>
-          </a:p>
-          <a:p>
-            <a:pPr/>
-            <a:r>
-              <a:t>**Data Science &amp; Machine Learning:** Data analysis, visualization, AI models. (e.g., Predictive analytics, recommendation systems)</a:t>
-            </a:r>
-          </a:p>
-          <a:p>
-            <a:pPr/>
-            <a:r>
-              <a:t>**Artificial Intelligence:** Natural Language Processing (NLP), Computer Vision. (e.g., Chatbots, facial recognition)</a:t>
-            </a:r>
-          </a:p>
-          <a:p>
-            <a:pPr/>
-            <a:r>
-              <a:t>**Automation &amp; Scripting:** Automating repetitive tasks, system administration. (e.g., File management, web scraping)</a:t>
-            </a:r>
-          </a:p>
-          <a:p>
-            <a:pPr/>
-            <a:r>
-              <a:t>**Game Development:** Prototyping, scripting game logic (Pygame).</a:t>
-            </a:r>
-          </a:p>
-          <a:p>
-            <a:pPr/>
-            <a:r>
-              <a:t>**Desktop GUI Applications:** Building graphical user interfaces (Tkinter, PyQt).</a:t>
-            </a:r>
-          </a:p>
-          <a:p>
-            <a:pPr/>
-            <a:r>
-              <a:t>**Scientific &amp; Numeric Computing:** Research, simulations (NumPy, SciPy).</a:t>
-            </a:r>
-          </a:p>
-          <a:p>
-            <a:pPr/>
-            <a:r>
-              <a:t>**Education:** Widely used as a first programming language due to its simplicity.</a:t>
-            </a:r>
-          </a:p>
-          <a:p>
-            <a:pPr/>
-            <a:r>
-              <a:t>**Real-life Impact:** Python powers many technologies you interact with daily.</a:t>
-            </a:r>
-          </a:p>
-        </p:txBody>
-      </p:sp>
-    </p:spTree>
-  </p:cSld>
-  <p:clrMapOvr>
-    <a:masterClrMapping/>
-  </p:clrMapOvr>
-</p:sld>
-</file>
-
-<file path=ppt/slides/slide17.xml><?xml version="1.0" encoding="utf-8"?>
-<p:sld xmlns:a="http://schemas.openxmlformats.org/drawingml/2006/main" xmlns:p="http://schemas.openxmlformats.org/presentationml/2006/main" xmlns:r="http://schemas.openxmlformats.org/officeDocument/2006/relationships">
-  <p:cSld>
-    <p:spTree>
-      <p:nvGrpSpPr>
-        <p:cNvPr id="1" name=""/>
-        <p:cNvGrpSpPr/>
-        <p:nvPr/>
-      </p:nvGrpSpPr>
-      <p:grpSpPr/>
-      <p:sp>
-        <p:nvSpPr>
-          <p:cNvPr id="2" name="Title 1"/>
-          <p:cNvSpPr>
-            <a:spLocks noGrp="1"/>
-          </p:cNvSpPr>
-          <p:nvPr>
-            <p:ph type="title"/>
-          </p:nvPr>
-        </p:nvSpPr>
-        <p:spPr/>
-        <p:txBody>
-          <a:bodyPr/>
-          <a:lstStyle/>
-          <a:p>
-            <a:r>
-              <a:t>Key Takeaways &amp; Your Next Steps</a:t>
-            </a:r>
-          </a:p>
-        </p:txBody>
-      </p:sp>
-      <p:sp>
-        <p:nvSpPr>
-          <p:cNvPr id="3" name="Content Placeholder 2"/>
-          <p:cNvSpPr>
-            <a:spLocks noGrp="1"/>
-          </p:cNvSpPr>
-          <p:nvPr>
-            <p:ph idx="1"/>
-          </p:nvPr>
-        </p:nvSpPr>
-        <p:spPr/>
-        <p:txBody>
-          <a:bodyPr/>
-          <a:lstStyle/>
-          <a:p>
-            <a:r>
-              <a:t>**Python is Powerful &amp; Versatile:** A foundational skill for many tech careers.</a:t>
-            </a:r>
-          </a:p>
-          <a:p>
-            <a:pPr/>
-            <a:r>
-              <a:t>**Focus on Basics:** Variables, operators, control flow, and data structures are your building blocks.</a:t>
-            </a:r>
-          </a:p>
-          <a:p>
-            <a:pPr/>
-            <a:r>
-              <a:t>**Practice, Practice, Practice:** The best way to learn is by writing code.</a:t>
-            </a:r>
-          </a:p>
-          <a:p>
-            <a:pPr/>
-            <a:r>
-              <a:t>**Explore &amp; Experiment:** Don't be afraid to try new things and debug code.</a:t>
-            </a:r>
-          </a:p>
-          <a:p>
-            <a:pPr/>
-            <a:r>
-              <a:t>**Utilize Resources:** Documentation, online tutorials, coding challenges (e.g., LeetCode, HackerRank).</a:t>
-            </a:r>
-          </a:p>
-          <a:p>
-            <a:pPr/>
-            <a:r>
-              <a:t>**Think Like a Programmer:** Break problems down, design solutions, implement, test.</a:t>
-            </a:r>
-          </a:p>
-          <a:p>
-            <a:pPr/>
-            <a:r>
-              <a:t>**Next Steps:** Dive deeper into specific data structures, object-oriented programming, error handling, and file I/O.</a:t>
+              <a:t>**What We've Covered:**</a:t>
+            </a:r>
+          </a:p>
+          <a:p>
+            <a:pPr/>
+            <a:r>
+              <a:t>   - Python's core philosophy and applications.</a:t>
+            </a:r>
+          </a:p>
+          <a:p>
+            <a:pPr/>
+            <a:r>
+              <a:t>   - Basic syntax, variables, and data types.</a:t>
+            </a:r>
+          </a:p>
+          <a:p>
+            <a:pPr/>
+            <a:r>
+              <a:t>   - Operators for calculations and comparisons.</a:t>
+            </a:r>
+          </a:p>
+          <a:p>
+            <a:pPr/>
+            <a:r>
+              <a:t>   - User interaction (`input()` and `print()`).</a:t>
+            </a:r>
+          </a:p>
+          <a:p>
+            <a:pPr/>
+            <a:r>
+              <a:t>   - Control flow: `if-elif-else` for decisions, `for` and `while` loops for repetition.</a:t>
+            </a:r>
+          </a:p>
+          <a:p>
+            <a:pPr/>
+            <a:r>
+              <a:t>   - Basic data structures: Lists and Tuples.</a:t>
+            </a:r>
+          </a:p>
+          <a:p>
+            <a:pPr/>
+            <a:r>
+              <a:t>   - Functions for code organization and reusability.</a:t>
+            </a:r>
+          </a:p>
+          <a:p>
+            <a:pPr/>
+            <a:r>
+              <a:t>   - The importance of comments.</a:t>
+            </a:r>
+          </a:p>
+          <a:p>
+            <a:pPr/>
+            <a:r>
+              <a:t>**Your Journey Continues:**</a:t>
+            </a:r>
+          </a:p>
+          <a:p>
+            <a:pPr/>
+            <a:r>
+              <a:t>   - Practice, practice, practice! The best way to learn is by doing.</a:t>
+            </a:r>
+          </a:p>
+          <a:p>
+            <a:pPr/>
+            <a:r>
+              <a:t>   - Experiment with the concepts we've discussed.</a:t>
+            </a:r>
+          </a:p>
+          <a:p>
+            <a:pPr/>
+            <a:r>
+              <a:t>   - Try solving small problems on your own.</a:t>
+            </a:r>
+          </a:p>
+          <a:p>
+            <a:pPr/>
+            <a:r>
+              <a:t>   - Explore Python's extensive documentation and online resources.</a:t>
+            </a:r>
+          </a:p>
+          <a:p>
+            <a:pPr/>
+            <a:r>
+              <a:t>   - Get ready for more advanced topics like Dictionaries, Sets, Object-Oriented Programming, and File I/O!</a:t>
+            </a:r>
+          </a:p>
+          <a:p>
+            <a:pPr/>
+            <a:r>
+              <a:t>**Remember:** Programming is a skill developed through consistent effort and curiosity. Embrace challenges, and don't be afraid to make mistakes – they are part of the learning process!</a:t>
             </a:r>
           </a:p>
         </p:txBody>
@@ -4268,7 +4119,7 @@
           <a:lstStyle/>
           <a:p>
             <a:r>
-              <a:t>What is Python? - The Friendly Language</a:t>
+              <a:t>2. Why Python? The Big Picture.</a:t>
             </a:r>
           </a:p>
         </p:txBody>
@@ -4289,49 +4140,97 @@
           <a:lstStyle/>
           <a:p>
             <a:r>
-              <a:t>**Definition:** A high-level, interpreted, general-purpose programming language.</a:t>
-            </a:r>
-          </a:p>
-          <a:p>
-            <a:pPr/>
-            <a:r>
-              <a:t>**Creator &amp; Year:** Guido van Rossum, 1991.</a:t>
-            </a:r>
-          </a:p>
-          <a:p>
-            <a:pPr/>
-            <a:r>
-              <a:t>**Key Characteristics:**</a:t>
-            </a:r>
-          </a:p>
-          <a:p>
-            <a:pPr/>
-            <a:r>
-              <a:t>  - **Simple &amp; Readable:** Emphasizes code readability with clear syntax.</a:t>
-            </a:r>
-          </a:p>
-          <a:p>
-            <a:pPr/>
-            <a:r>
-              <a:t>  - **Versatile:** Used for web development, data science, AI, automation, etc.</a:t>
-            </a:r>
-          </a:p>
-          <a:p>
-            <a:pPr/>
-            <a:r>
-              <a:t>  - **Interpreted:** Code is executed line by line, no separate compilation step.</a:t>
-            </a:r>
-          </a:p>
-          <a:p>
-            <a:pPr/>
-            <a:r>
-              <a:t>  - **Object-Oriented:** Supports object-oriented programming paradigms.</a:t>
-            </a:r>
-          </a:p>
-          <a:p>
-            <a:pPr/>
-            <a:r>
-              <a:t>  - **Dynamically Typed:** Variable types are determined at runtime.</a:t>
+              <a:t>**Overview:** What is Python?</a:t>
+            </a:r>
+          </a:p>
+          <a:p>
+            <a:pPr/>
+            <a:r>
+              <a:t>   - A high-level, interpreted, general-purpose programming language.</a:t>
+            </a:r>
+          </a:p>
+          <a:p>
+            <a:pPr/>
+            <a:r>
+              <a:t>   - Created by Guido van Rossum and first released in 1991.</a:t>
+            </a:r>
+          </a:p>
+          <a:p>
+            <a:pPr/>
+            <a:r>
+              <a:t>**Key Features (Theory):**</a:t>
+            </a:r>
+          </a:p>
+          <a:p>
+            <a:pPr/>
+            <a:r>
+              <a:t>   - **Simplicity &amp; Readability:** English-like syntax, easy to learn.</a:t>
+            </a:r>
+          </a:p>
+          <a:p>
+            <a:pPr/>
+            <a:r>
+              <a:t>   - **Versatility:** Can be used for almost anything.</a:t>
+            </a:r>
+          </a:p>
+          <a:p>
+            <a:pPr/>
+            <a:r>
+              <a:t>   - **Cross-Platform:** Runs on Windows, macOS, Linux.</a:t>
+            </a:r>
+          </a:p>
+          <a:p>
+            <a:pPr/>
+            <a:r>
+              <a:t>   - **Extensive Libraries:** Huge collection of pre-written code for various tasks.</a:t>
+            </a:r>
+          </a:p>
+          <a:p>
+            <a:pPr/>
+            <a:r>
+              <a:t>   - **Interpreted:** Code runs line by line, no separate compilation step.</a:t>
+            </a:r>
+          </a:p>
+          <a:p>
+            <a:pPr/>
+            <a:r>
+              <a:t>**Real-life Applications (Why it matters to YOU):**</a:t>
+            </a:r>
+          </a:p>
+          <a:p>
+            <a:pPr/>
+            <a:r>
+              <a:t>   - **Web Development:** Instagram, Spotify, Dropbox (Backend).</a:t>
+            </a:r>
+          </a:p>
+          <a:p>
+            <a:pPr/>
+            <a:r>
+              <a:t>   - **Data Science &amp; AI:** Machine Learning, Data Analysis (e.g., predicting stock prices, medical diagnosis).</a:t>
+            </a:r>
+          </a:p>
+          <a:p>
+            <a:pPr/>
+            <a:r>
+              <a:t>   - **Automation:** Scripting repetitive tasks (e.g., organizing files, sending emails).</a:t>
+            </a:r>
+          </a:p>
+          <a:p>
+            <a:pPr/>
+            <a:r>
+              <a:t>   - **Game Development:** Pygame library.</a:t>
+            </a:r>
+          </a:p>
+          <a:p>
+            <a:pPr/>
+            <a:r>
+              <a:t>   - **Scientific Computing:** Research, simulations.</a:t>
+            </a:r>
+          </a:p>
+          <a:p>
+            <a:pPr/>
+            <a:r>
+              <a:t>   - **Education:** Often the first language taught due to its simplicity.</a:t>
             </a:r>
           </a:p>
         </p:txBody>
@@ -4370,7 +4269,7 @@
           <a:lstStyle/>
           <a:p>
             <a:r>
-              <a:t>Why Python? Your Gateway to Future Tech</a:t>
+              <a:t>3. Getting Started: Setting Up Your Python Environment</a:t>
             </a:r>
           </a:p>
         </p:txBody>
@@ -4391,31 +4290,73 @@
           <a:lstStyle/>
           <a:p>
             <a:r>
-              <a:t>**Beginner-Friendly:** Simple syntax makes it easy to learn and start coding.</a:t>
-            </a:r>
-          </a:p>
-          <a:p>
-            <a:pPr/>
-            <a:r>
-              <a:t>**High Demand:** One of the most sought-after programming skills in the job market.</a:t>
-            </a:r>
-          </a:p>
-          <a:p>
-            <a:pPr/>
-            <a:r>
-              <a:t>**Vast Applications:** Web development (Django, Flask), Data Science (NumPy, Pandas), Machine Learning (TensorFlow, PyTorch), Automation, Game Development.</a:t>
-            </a:r>
-          </a:p>
-          <a:p>
-            <a:pPr/>
-            <a:r>
-              <a:t>**Large Community &amp; Resources:** Abundant support, libraries, and frameworks available.</a:t>
-            </a:r>
-          </a:p>
-          <a:p>
-            <a:pPr/>
-            <a:r>
-              <a:t>**Boosts Problem-Solving:** Helps develop logical thinking and computational skills.</a:t>
+              <a:t>**Python Installation (Theory):**</a:t>
+            </a:r>
+          </a:p>
+          <a:p>
+            <a:pPr/>
+            <a:r>
+              <a:t>   - Download from python.org (latest stable version).</a:t>
+            </a:r>
+          </a:p>
+          <a:p>
+            <a:pPr/>
+            <a:r>
+              <a:t>   - Ensure 'Add Python to PATH' is checked during installation (crucial for command line access).</a:t>
+            </a:r>
+          </a:p>
+          <a:p>
+            <a:pPr/>
+            <a:r>
+              <a:t>**Integrated Development Environments (IDEs) &amp; Code Editors:**</a:t>
+            </a:r>
+          </a:p>
+          <a:p>
+            <a:pPr/>
+            <a:r>
+              <a:t>   - **What are they?** Software to write, run, and debug code more efficiently.</a:t>
+            </a:r>
+          </a:p>
+          <a:p>
+            <a:pPr/>
+            <a:r>
+              <a:t>   - **Popular Choices for Beginners:**</a:t>
+            </a:r>
+          </a:p>
+          <a:p>
+            <a:pPr/>
+            <a:r>
+              <a:t>       - **IDLE (Integrated Development and Learning Environment):** Comes with Python, simple for basic scripts.</a:t>
+            </a:r>
+          </a:p>
+          <a:p>
+            <a:pPr/>
+            <a:r>
+              <a:t>       - **VS Code (Visual Studio Code):** Highly popular, lightweight, versatile with extensions (recommended for flexibility).</a:t>
+            </a:r>
+          </a:p>
+          <a:p>
+            <a:pPr/>
+            <a:r>
+              <a:t>       - **PyCharm (Community Edition):** Full-featured IDE, great for larger projects (can be overwhelming for absolute beginners).</a:t>
+            </a:r>
+          </a:p>
+          <a:p>
+            <a:pPr/>
+            <a:r>
+              <a:t>**Your First Interaction (Real-life):**</a:t>
+            </a:r>
+          </a:p>
+          <a:p>
+            <a:pPr/>
+            <a:r>
+              <a:t>   - Open your chosen editor/IDE.</a:t>
+            </a:r>
+          </a:p>
+          <a:p>
+            <a:pPr/>
+            <a:r>
+              <a:t>   - We'll write our first program there.</a:t>
             </a:r>
           </a:p>
         </p:txBody>
@@ -4454,7 +4395,7 @@
           <a:lstStyle/>
           <a:p>
             <a:r>
-              <a:t>A Brief History of Python</a:t>
+              <a:t>4. Your First Program: 'Hello, World!'</a:t>
             </a:r>
           </a:p>
         </p:txBody>
@@ -4475,43 +4416,79 @@
           <a:lstStyle/>
           <a:p>
             <a:r>
-              <a:t>**Early 1990s:** Created by Guido van Rossum at CWI in the Netherlands.</a:t>
-            </a:r>
-          </a:p>
-          <a:p>
-            <a:pPr/>
-            <a:r>
-              <a:t>**Inspiration:** ABC language, with influences from Modula-3.</a:t>
-            </a:r>
-          </a:p>
-          <a:p>
-            <a:pPr/>
-            <a:r>
-              <a:t>**Named After:** Monty Python's Flying Circus, reflecting its fun and quirky nature.</a:t>
-            </a:r>
-          </a:p>
-          <a:p>
-            <a:pPr/>
-            <a:r>
-              <a:t>**Key Milestones:**</a:t>
-            </a:r>
-          </a:p>
-          <a:p>
-            <a:pPr/>
-            <a:r>
-              <a:t>  - **Python 2.0 (2000):** Introduced list comprehensions and garbage collection.</a:t>
-            </a:r>
-          </a:p>
-          <a:p>
-            <a:pPr/>
-            <a:r>
-              <a:t>  - **Python 3.0 (2008):** A significant, backward-incompatible release, modernizing the language (focus of this course).</a:t>
-            </a:r>
-          </a:p>
-          <a:p>
-            <a:pPr/>
-            <a:r>
-              <a:t>**Continuous Evolution:** Actively developed and maintained by the Python Software Foundation (PSF).</a:t>
+              <a:t>**The 'Hello, World!' Tradition (Theory):**</a:t>
+            </a:r>
+          </a:p>
+          <a:p>
+            <a:pPr/>
+            <a:r>
+              <a:t>   - The simplest program, universally used to test a new language setup.</a:t>
+            </a:r>
+          </a:p>
+          <a:p>
+            <a:pPr/>
+            <a:r>
+              <a:t>**Python's `print()` Function (Theory):**</a:t>
+            </a:r>
+          </a:p>
+          <a:p>
+            <a:pPr/>
+            <a:r>
+              <a:t>   - Purpose: Displays output to the console.</a:t>
+            </a:r>
+          </a:p>
+          <a:p>
+            <a:pPr/>
+            <a:r>
+              <a:t>   - Syntax: `print(value1, value2, ...)`</a:t>
+            </a:r>
+          </a:p>
+          <a:p>
+            <a:pPr/>
+            <a:r>
+              <a:t>   - Values can be text (strings), numbers, or results of operations.</a:t>
+            </a:r>
+          </a:p>
+          <a:p>
+            <a:pPr/>
+            <a:r>
+              <a:t>**Step-by-Step (Textbook Example):**</a:t>
+            </a:r>
+          </a:p>
+          <a:p>
+            <a:pPr/>
+            <a:r>
+              <a:t>   1. Open a new file (e.g., `first_program.py`).</a:t>
+            </a:r>
+          </a:p>
+          <a:p>
+            <a:pPr/>
+            <a:r>
+              <a:t>   2. Type: `print('Hello, World!')`</a:t>
+            </a:r>
+          </a:p>
+          <a:p>
+            <a:pPr/>
+            <a:r>
+              <a:t>   3. Save the file.</a:t>
+            </a:r>
+          </a:p>
+          <a:p>
+            <a:pPr/>
+            <a:r>
+              <a:t>   4. Run it (from your IDE or command line: `python first_program.py`).</a:t>
+            </a:r>
+          </a:p>
+          <a:p>
+            <a:pPr/>
+            <a:r>
+              <a:t>**Real-life Application Analogy:**</a:t>
+            </a:r>
+          </a:p>
+          <a:p>
+            <a:pPr/>
+            <a:r>
+              <a:t>   - Think of `print()` as speaking out loud or displaying a message on a screen. It's how your program communicates with you.</a:t>
             </a:r>
           </a:p>
         </p:txBody>
@@ -4550,7 +4527,7 @@
           <a:lstStyle/>
           <a:p>
             <a:r>
-              <a:t>Setting Up Your Python Environment</a:t>
+              <a:t>5. Variables: Your Data's Name Tags</a:t>
             </a:r>
           </a:p>
         </p:txBody>
@@ -4571,49 +4548,127 @@
           <a:lstStyle/>
           <a:p>
             <a:r>
-              <a:t>**Python Interpreter:** The program that reads and executes your Python code. Download from python.org.</a:t>
-            </a:r>
-          </a:p>
-          <a:p>
-            <a:pPr/>
-            <a:r>
-              <a:t>**Integrated Development Environments (IDEs) / Code Editors:**</a:t>
-            </a:r>
-          </a:p>
-          <a:p>
-            <a:pPr/>
-            <a:r>
-              <a:t>  - **Why use them?** Enhance productivity with features like syntax highlighting, auto-completion, debugging.</a:t>
-            </a:r>
-          </a:p>
-          <a:p>
-            <a:pPr/>
-            <a:r>
-              <a:t>  - **Popular Choices:** PyCharm, VS Code, Sublime Text, Atom. Online options: Repl.it, Google Colab.</a:t>
-            </a:r>
-          </a:p>
-          <a:p>
-            <a:pPr/>
-            <a:r>
-              <a:t>**Installation Steps (Conceptual):**</a:t>
-            </a:r>
-          </a:p>
-          <a:p>
-            <a:pPr/>
-            <a:r>
-              <a:t>  - Download installer from python.org.</a:t>
-            </a:r>
-          </a:p>
-          <a:p>
-            <a:pPr/>
-            <a:r>
-              <a:t>  - Run installer (check 'Add Python to PATH' during installation).</a:t>
-            </a:r>
-          </a:p>
-          <a:p>
-            <a:pPr/>
-            <a:r>
-              <a:t>  - Verify installation: Open terminal/command prompt and type `python --version` or `python3 --version`.</a:t>
+              <a:t>**What are Variables? (Theory):**</a:t>
+            </a:r>
+          </a:p>
+          <a:p>
+            <a:pPr/>
+            <a:r>
+              <a:t>   - Named storage locations in the computer's memory.</a:t>
+            </a:r>
+          </a:p>
+          <a:p>
+            <a:pPr/>
+            <a:r>
+              <a:t>   - Used to store data that can be changed or 'varied' during program execution.</a:t>
+            </a:r>
+          </a:p>
+          <a:p>
+            <a:pPr/>
+            <a:r>
+              <a:t>**Real-life Analogy:**</a:t>
+            </a:r>
+          </a:p>
+          <a:p>
+            <a:pPr/>
+            <a:r>
+              <a:t>   - Imagine a variable as a labeled box. You put something inside the box, and you can change what's inside, but the label (variable name) stays the same.</a:t>
+            </a:r>
+          </a:p>
+          <a:p>
+            <a:pPr/>
+            <a:r>
+              <a:t>**Declaring &amp; Assigning (Theory &amp; Textbook Example):**</a:t>
+            </a:r>
+          </a:p>
+          <a:p>
+            <a:pPr/>
+            <a:r>
+              <a:t>   - Python variables are created the moment you assign a value to them.</a:t>
+            </a:r>
+          </a:p>
+          <a:p>
+            <a:pPr/>
+            <a:r>
+              <a:t>   - Syntax: `variable_name = value`</a:t>
+            </a:r>
+          </a:p>
+          <a:p>
+            <a:pPr/>
+            <a:r>
+              <a:t>   - Example: `my_age = 25`</a:t>
+            </a:r>
+          </a:p>
+          <a:p>
+            <a:pPr/>
+            <a:r>
+              <a:t>   - Example: `user_name = 'Alice'`</a:t>
+            </a:r>
+          </a:p>
+          <a:p>
+            <a:pPr/>
+            <a:r>
+              <a:t>**Variable Naming Rules (Important for Readability &amp; Avoiding Errors):**</a:t>
+            </a:r>
+          </a:p>
+          <a:p>
+            <a:pPr/>
+            <a:r>
+              <a:t>   - Must start with a letter or an underscore (`_`).</a:t>
+            </a:r>
+          </a:p>
+          <a:p>
+            <a:pPr/>
+            <a:r>
+              <a:t>   - Cannot start with a number.</a:t>
+            </a:r>
+          </a:p>
+          <a:p>
+            <a:pPr/>
+            <a:r>
+              <a:t>   - Can only contain alpha-numeric characters and underscores (A-z, 0-9, _).</a:t>
+            </a:r>
+          </a:p>
+          <a:p>
+            <a:pPr/>
+            <a:r>
+              <a:t>   - Case-sensitive (`age` is different from `Age`).</a:t>
+            </a:r>
+          </a:p>
+          <a:p>
+            <a:pPr/>
+            <a:r>
+              <a:t>   - Cannot be Python keywords (e.g., `if`, `for`, `print`).</a:t>
+            </a:r>
+          </a:p>
+          <a:p>
+            <a:pPr/>
+            <a:r>
+              <a:t>**Applying it (Story Problem):**</a:t>
+            </a:r>
+          </a:p>
+          <a:p>
+            <a:pPr/>
+            <a:r>
+              <a:t>   - You are building a system for a library. You need to store the title of a book, its author, and the number of copies available. How would you use variables for this?</a:t>
+            </a:r>
+          </a:p>
+          <a:p>
+            <a:pPr/>
+            <a:r>
+              <a:t>     `book_title = 'The Great Adventure'`</a:t>
+            </a:r>
+          </a:p>
+          <a:p>
+            <a:pPr/>
+            <a:r>
+              <a:t>     `book_author = 'Jane Doe'`</a:t>
+            </a:r>
+          </a:p>
+          <a:p>
+            <a:pPr/>
+            <a:r>
+              <a:t>     `copies_available = 10`</a:t>
             </a:r>
           </a:p>
         </p:txBody>
@@ -4652,7 +4707,7 @@
           <a:lstStyle/>
           <a:p>
             <a:r>
-              <a:t>Your First Python Program: "Hello, World!"</a:t>
+              <a:t>6. Data Types: What Kind of Information?</a:t>
             </a:r>
           </a:p>
         </p:txBody>
@@ -4673,67 +4728,133 @@
           <a:lstStyle/>
           <a:p>
             <a:r>
-              <a:t>**Goal:** Display the text "Hello, World!" on the screen.</a:t>
-            </a:r>
-          </a:p>
-          <a:p>
-            <a:pPr/>
-            <a:r>
-              <a:t>**The `print()` Function:**</a:t>
-            </a:r>
-          </a:p>
-          <a:p>
-            <a:pPr/>
-            <a:r>
-              <a:t>  - `print("Hello, World!")`</a:t>
-            </a:r>
-          </a:p>
-          <a:p>
-            <a:pPr/>
-            <a:r>
-              <a:t>  - Used to output data to the console.</a:t>
-            </a:r>
-          </a:p>
-          <a:p>
-            <a:pPr/>
-            <a:r>
-              <a:t>  - Parentheses `()` enclose the arguments (what you want to print).</a:t>
-            </a:r>
-          </a:p>
-          <a:p>
-            <a:pPr/>
-            <a:r>
-              <a:t>  - Strings (text) are enclosed in quotes `""` or `''`.</a:t>
-            </a:r>
-          </a:p>
-          <a:p>
-            <a:pPr/>
-            <a:r>
-              <a:t>**How to Run:**</a:t>
-            </a:r>
-          </a:p>
-          <a:p>
-            <a:pPr/>
-            <a:r>
-              <a:t>  - Save your code in a file (e.g., `hello.py`).</a:t>
-            </a:r>
-          </a:p>
-          <a:p>
-            <a:pPr/>
-            <a:r>
-              <a:t>  - Open terminal/command prompt, navigate to the file's directory.</a:t>
-            </a:r>
-          </a:p>
-          <a:p>
-            <a:pPr/>
-            <a:r>
-              <a:t>  - Run using: `python hello.py`</a:t>
-            </a:r>
-          </a:p>
-          <a:p>
-            <a:pPr/>
-            <a:r>
-              <a:t>**Real-life Analogy:** Like saying your first words, it's the fundamental way to communicate with your program.</a:t>
+              <a:t>**What are Data Types? (Theory):**</a:t>
+            </a:r>
+          </a:p>
+          <a:p>
+            <a:pPr/>
+            <a:r>
+              <a:t>   - Classifications that specify which type of value a variable can hold.</a:t>
+            </a:r>
+          </a:p>
+          <a:p>
+            <a:pPr/>
+            <a:r>
+              <a:t>   - Python automatically infers the data type based on the assigned value.</a:t>
+            </a:r>
+          </a:p>
+          <a:p>
+            <a:pPr/>
+            <a:r>
+              <a:t>**Real-life Analogy:**</a:t>
+            </a:r>
+          </a:p>
+          <a:p>
+            <a:pPr/>
+            <a:r>
+              <a:t>   - Just as you have different types of containers for different types of food (e.g., a jar for jam, a bottle for milk), variables have different types to hold different kinds of data.</a:t>
+            </a:r>
+          </a:p>
+          <a:p>
+            <a:pPr/>
+            <a:r>
+              <a:t>**Common Python Data Types (Theory &amp; Examples):**</a:t>
+            </a:r>
+          </a:p>
+          <a:p>
+            <a:pPr/>
+            <a:r>
+              <a:t>   1. **Integers (`int`):** Whole numbers (positive, negative, or zero).</a:t>
+            </a:r>
+          </a:p>
+          <a:p>
+            <a:pPr/>
+            <a:r>
+              <a:t>      - Real-life: Number of students in a class, year of birth.</a:t>
+            </a:r>
+          </a:p>
+          <a:p>
+            <a:pPr/>
+            <a:r>
+              <a:t>      - Example: `student_count = 30`, `year = 2023`</a:t>
+            </a:r>
+          </a:p>
+          <a:p>
+            <a:pPr/>
+            <a:r>
+              <a:t>   2. **Floating-Point Numbers (`float`):** Numbers with a decimal point.</a:t>
+            </a:r>
+          </a:p>
+          <a:p>
+            <a:pPr/>
+            <a:r>
+              <a:t>      - Real-life: Prices, temperatures, measurements.</a:t>
+            </a:r>
+          </a:p>
+          <a:p>
+            <a:pPr/>
+            <a:r>
+              <a:t>      - Example: `price = 19.99`, `temperature = 25.5`</a:t>
+            </a:r>
+          </a:p>
+          <a:p>
+            <a:pPr/>
+            <a:r>
+              <a:t>   3. **Strings (`str`):** Sequences of characters (text). Enclosed in single or double quotes.</a:t>
+            </a:r>
+          </a:p>
+          <a:p>
+            <a:pPr/>
+            <a:r>
+              <a:t>      - Real-life: Names, addresses, messages.</a:t>
+            </a:r>
+          </a:p>
+          <a:p>
+            <a:pPr/>
+            <a:r>
+              <a:t>      - Example: `greeting = 'Hello'`, `product_name = "Laptop"`</a:t>
+            </a:r>
+          </a:p>
+          <a:p>
+            <a:pPr/>
+            <a:r>
+              <a:t>   4. **Booleans (`bool`):** Represents truth values: `True` or `False` (case-sensitive).</a:t>
+            </a:r>
+          </a:p>
+          <a:p>
+            <a:pPr/>
+            <a:r>
+              <a:t>      - Real-life: A light switch (on/off), is a condition met (yes/no).</a:t>
+            </a:r>
+          </a:p>
+          <a:p>
+            <a:pPr/>
+            <a:r>
+              <a:t>      - Example: `is_active = True`, `is_logged_in = False`</a:t>
+            </a:r>
+          </a:p>
+          <a:p>
+            <a:pPr/>
+            <a:r>
+              <a:t>   **(Optional for 1st year) Type Conversion (`type()` &amp; `int()`, `str()`, `float()`):**</a:t>
+            </a:r>
+          </a:p>
+          <a:p>
+            <a:pPr/>
+            <a:r>
+              <a:t>   - `type(variable)`: Tells you the data type of a variable.</a:t>
+            </a:r>
+          </a:p>
+          <a:p>
+            <a:pPr/>
+            <a:r>
+              <a:t>   - `age_str = '25'`, `age_int = int(age_str)` (converting string to integer).</a:t>
+            </a:r>
+          </a:p>
+          <a:p>
+            <a:pPr/>
+            <a:r>
+              <a:t>   - Important for handling user input, which is always a string by default.</a:t>
             </a:r>
           </a:p>
         </p:txBody>
@@ -4772,7 +4893,7 @@
           <a:lstStyle/>
           <a:p>
             <a:r>
-              <a:t>Python Basics: Variables &amp; Data Types</a:t>
+              <a:t>7. Operators: Performing Actions on Data</a:t>
             </a:r>
           </a:p>
         </p:txBody>
@@ -4793,67 +4914,187 @@
           <a:lstStyle/>
           <a:p>
             <a:r>
-              <a:t>**Variables:**</a:t>
-            </a:r>
-          </a:p>
-          <a:p>
-            <a:pPr/>
-            <a:r>
-              <a:t>  - **Definition:** Named storage locations for data.</a:t>
-            </a:r>
-          </a:p>
-          <a:p>
-            <a:pPr/>
-            <a:r>
-              <a:t>  - **Declaration:** `variable_name = value` (no explicit type declaration needed).</a:t>
-            </a:r>
-          </a:p>
-          <a:p>
-            <a:pPr/>
-            <a:r>
-              <a:t>  - **Naming Rules:** Start with letter/underscore, contain letters/numbers/underscores, case-sensitive.</a:t>
-            </a:r>
-          </a:p>
-          <a:p>
-            <a:pPr/>
-            <a:r>
-              <a:t>  - **Real-life Analogy:** Labeled boxes where you store different items.</a:t>
-            </a:r>
-          </a:p>
-          <a:p>
-            <a:pPr/>
-            <a:r>
-              <a:t>**Common Data Types:**</a:t>
-            </a:r>
-          </a:p>
-          <a:p>
-            <a:pPr/>
-            <a:r>
-              <a:t>  - **Integers (`int`):** Whole numbers (e.g., `10`, `-5`, `0`).</a:t>
-            </a:r>
-          </a:p>
-          <a:p>
-            <a:pPr/>
-            <a:r>
-              <a:t>  - **Floating-point Numbers (`float`):** Numbers with decimal points (e.g., `3.14`, `-0.5`).</a:t>
-            </a:r>
-          </a:p>
-          <a:p>
-            <a:pPr/>
-            <a:r>
-              <a:t>  - **Strings (`str`):** Sequences of characters (text) enclosed in quotes (e.g., `"Hello"`, `'Python'`).</a:t>
-            </a:r>
-          </a:p>
-          <a:p>
-            <a:pPr/>
-            <a:r>
-              <a:t>  - **Booleans (`bool`):** Represents truth values (`True` or `False`).</a:t>
-            </a:r>
-          </a:p>
-          <a:p>
-            <a:pPr/>
-            <a:r>
-              <a:t>**Checking Type:** Use `type(variable_name)` function.</a:t>
+              <a:t>**What are Operators? (Theory):**</a:t>
+            </a:r>
+          </a:p>
+          <a:p>
+            <a:pPr/>
+            <a:r>
+              <a:t>   - Special symbols that perform operations on one or more values (operands).</a:t>
+            </a:r>
+          </a:p>
+          <a:p>
+            <a:pPr/>
+            <a:r>
+              <a:t>**Real-life Analogy:**</a:t>
+            </a:r>
+          </a:p>
+          <a:p>
+            <a:pPr/>
+            <a:r>
+              <a:t>   - Think of operators as verbs in a sentence. They describe an action to be performed (e.g., 'add', 'compare', 'assign').</a:t>
+            </a:r>
+          </a:p>
+          <a:p>
+            <a:pPr/>
+            <a:r>
+              <a:t>**Types of Operators (Theory &amp; Examples):**</a:t>
+            </a:r>
+          </a:p>
+          <a:p>
+            <a:pPr/>
+            <a:r>
+              <a:t>   1. **Arithmetic Operators (Mathematical Calculations):**</a:t>
+            </a:r>
+          </a:p>
+          <a:p>
+            <a:pPr/>
+            <a:r>
+              <a:t>      - `+` (Addition): `5 + 3` -&gt; `8`</a:t>
+            </a:r>
+          </a:p>
+          <a:p>
+            <a:pPr/>
+            <a:r>
+              <a:t>      - `-` (Subtraction): `10 - 4` -&gt; `6`</a:t>
+            </a:r>
+          </a:p>
+          <a:p>
+            <a:pPr/>
+            <a:r>
+              <a:t>      - `*` (Multiplication): `2 * 6` -&gt; `12`</a:t>
+            </a:r>
+          </a:p>
+          <a:p>
+            <a:pPr/>
+            <a:r>
+              <a:t>      - `/` (Division): `10 / 3` -&gt; `3.333...` (always float)</a:t>
+            </a:r>
+          </a:p>
+          <a:p>
+            <a:pPr/>
+            <a:r>
+              <a:t>      - `//` (Floor Division): `10 // 3` -&gt; `3` (integer result)</a:t>
+            </a:r>
+          </a:p>
+          <a:p>
+            <a:pPr/>
+            <a:r>
+              <a:t>      - `%` (Modulo - Remainder): `10 % 3` -&gt; `1`</a:t>
+            </a:r>
+          </a:p>
+          <a:p>
+            <a:pPr/>
+            <a:r>
+              <a:t>      - `**` (Exponentiation): `2 ** 3` -&gt; `8` (2 to the power of 3)</a:t>
+            </a:r>
+          </a:p>
+          <a:p>
+            <a:pPr/>
+            <a:r>
+              <a:t>   2. **Comparison Operators (Comparing Values, Result is Boolean):**</a:t>
+            </a:r>
+          </a:p>
+          <a:p>
+            <a:pPr/>
+            <a:r>
+              <a:t>      - `==` (Equal to): `5 == 5` -&gt; `True`</a:t>
+            </a:r>
+          </a:p>
+          <a:p>
+            <a:pPr/>
+            <a:r>
+              <a:t>      - `!=` (Not equal to): `5 != 3` -&gt; `True`</a:t>
+            </a:r>
+          </a:p>
+          <a:p>
+            <a:pPr/>
+            <a:r>
+              <a:t>      - `&gt;` (Greater than): `7 &gt; 4` -&gt; `True`</a:t>
+            </a:r>
+          </a:p>
+          <a:p>
+            <a:pPr/>
+            <a:r>
+              <a:t>      - `&lt;` (Less than): `2 &lt; 8` -&gt; `True`</a:t>
+            </a:r>
+          </a:p>
+          <a:p>
+            <a:pPr/>
+            <a:r>
+              <a:t>      - `&gt;=` (Greater than or equal to): `5 &gt;= 5` -&gt; `True`</a:t>
+            </a:r>
+          </a:p>
+          <a:p>
+            <a:pPr/>
+            <a:r>
+              <a:t>      - `&lt;=` (Less than or equal to): `3 &lt;= 6` -&gt; `True`</a:t>
+            </a:r>
+          </a:p>
+          <a:p>
+            <a:pPr/>
+            <a:r>
+              <a:t>   3. **Logical Operators (Combining Boolean Conditions):**</a:t>
+            </a:r>
+          </a:p>
+          <a:p>
+            <a:pPr/>
+            <a:r>
+              <a:t>      - `and`: `True and False` -&gt; `False` (Both must be True)</a:t>
+            </a:r>
+          </a:p>
+          <a:p>
+            <a:pPr/>
+            <a:r>
+              <a:t>      - `or`: `True or False` -&gt; `True` (At least one must be True)</a:t>
+            </a:r>
+          </a:p>
+          <a:p>
+            <a:pPr/>
+            <a:r>
+              <a:t>      - `not`: `not True` -&gt; `False` (Inverts the boolean value)</a:t>
+            </a:r>
+          </a:p>
+          <a:p>
+            <a:pPr/>
+            <a:r>
+              <a:t>   4. **Assignment Operators (Assigning Values):**</a:t>
+            </a:r>
+          </a:p>
+          <a:p>
+            <a:pPr/>
+            <a:r>
+              <a:t>      - `=` (Assign): `x = 10`</a:t>
+            </a:r>
+          </a:p>
+          <a:p>
+            <a:pPr/>
+            <a:r>
+              <a:t>      - `+=` (Add and assign): `x += 5` is equivalent to `x = x + 5`</a:t>
+            </a:r>
+          </a:p>
+          <a:p>
+            <a:pPr/>
+            <a:r>
+              <a:t>      - `-=` (Subtract and assign): `y -= 2` is equivalent to `y = y - 2`</a:t>
+            </a:r>
+          </a:p>
+          <a:p>
+            <a:pPr/>
+            <a:r>
+              <a:t>      - (and others like `*=`, `/=`, etc.)</a:t>
+            </a:r>
+          </a:p>
+          <a:p>
+            <a:pPr/>
+            <a:r>
+              <a:t>**Story Problem:**</a:t>
+            </a:r>
+          </a:p>
+          <a:p>
+            <a:pPr/>
+            <a:r>
+              <a:t>   - A student scores 85 in Math and 70 in Science. Is their average score greater than or equal to 75? Use variables and operators to find out. (Hint: `(math_score + science_score) / 2 &gt;= 75`)</a:t>
             </a:r>
           </a:p>
         </p:txBody>
@@ -4892,7 +5133,7 @@
           <a:lstStyle/>
           <a:p>
             <a:r>
-              <a:t>Python Basics: Operators - The Action Words</a:t>
+              <a:t>8. Interacting with Users: Input and Output</a:t>
             </a:r>
           </a:p>
         </p:txBody>
@@ -4913,67 +5154,115 @@
           <a:lstStyle/>
           <a:p>
             <a:r>
-              <a:t>**Operators:** Symbols that perform operations on values and variables.</a:t>
-            </a:r>
-          </a:p>
-          <a:p>
-            <a:pPr/>
-            <a:r>
-              <a:t>**1. Arithmetic Operators:** Perform mathematical calculations.</a:t>
-            </a:r>
-          </a:p>
-          <a:p>
-            <a:pPr/>
-            <a:r>
-              <a:t>  - `+` (Addition), `-` (Subtraction), `*` (Multiplication), `/` (Division), `//` (Floor Division), `%` (Modulo), `**` (Exponentiation).</a:t>
-            </a:r>
-          </a:p>
-          <a:p>
-            <a:pPr/>
-            <a:r>
-              <a:t>  - **Example:** `result = 10 + 5`</a:t>
-            </a:r>
-          </a:p>
-          <a:p>
-            <a:pPr/>
-            <a:r>
-              <a:t>**2. Comparison (Relational) Operators:** Compare two values, return `True` or `False`.</a:t>
-            </a:r>
-          </a:p>
-          <a:p>
-            <a:pPr/>
-            <a:r>
-              <a:t>  - `==` (Equal to), `!=` (Not equal to), `&gt;` (Greater than), `&lt;` (Less than), `&gt;=` (Greater than or equal to), `&lt;=` (Less than or equal to).</a:t>
-            </a:r>
-          </a:p>
-          <a:p>
-            <a:pPr/>
-            <a:r>
-              <a:t>  - **Example:** `is_equal = (x == y)`</a:t>
-            </a:r>
-          </a:p>
-          <a:p>
-            <a:pPr/>
-            <a:r>
-              <a:t>**3. Logical Operators:** Combine conditional statements.</a:t>
-            </a:r>
-          </a:p>
-          <a:p>
-            <a:pPr/>
-            <a:r>
-              <a:t>  - `and` (Both conditions must be true), `or` (At least one condition must be true), `not` (Reverses the boolean state).</a:t>
-            </a:r>
-          </a:p>
-          <a:p>
-            <a:pPr/>
-            <a:r>
-              <a:t>  - **Example:** `can_vote = (age &gt;= 18 and citizenship == True)`</a:t>
-            </a:r>
-          </a:p>
-          <a:p>
-            <a:pPr/>
-            <a:r>
-              <a:t>**Real-life Analogy:** Like verbs in a sentence, they describe actions or comparisons.</a:t>
+              <a:t>**Output: Revisiting `print()` (Theory):**</a:t>
+            </a:r>
+          </a:p>
+          <a:p>
+            <a:pPr/>
+            <a:r>
+              <a:t>   - We've seen `print()` for displaying information.</a:t>
+            </a:r>
+          </a:p>
+          <a:p>
+            <a:pPr/>
+            <a:r>
+              <a:t>   - Can combine text and variables: `name = 'Alice'`, `print('Hello, ' + name)`</a:t>
+            </a:r>
+          </a:p>
+          <a:p>
+            <a:pPr/>
+            <a:r>
+              <a:t>   - Can use f-strings (formatted string literals) for cleaner output: `print(f'Hello, {name}')` (recommended for modern Python).</a:t>
+            </a:r>
+          </a:p>
+          <a:p>
+            <a:pPr/>
+            <a:r>
+              <a:t>**Input: Getting Data from the User (Theory):**</a:t>
+            </a:r>
+          </a:p>
+          <a:p>
+            <a:pPr/>
+            <a:r>
+              <a:t>   - The `input()` function allows your program to receive data from the user via the keyboard.</a:t>
+            </a:r>
+          </a:p>
+          <a:p>
+            <a:pPr/>
+            <a:r>
+              <a:t>   - Syntax: `variable = input('Prompt message: ')`</a:t>
+            </a:r>
+          </a:p>
+          <a:p>
+            <a:pPr/>
+            <a:r>
+              <a:t>   - **Important Note:** `input()` always reads data as a **string**.</a:t>
+            </a:r>
+          </a:p>
+          <a:p>
+            <a:pPr/>
+            <a:r>
+              <a:t>**Real-life Analogy:**</a:t>
+            </a:r>
+          </a:p>
+          <a:p>
+            <a:pPr/>
+            <a:r>
+              <a:t>   - `print()` is like your program talking to you.</a:t>
+            </a:r>
+          </a:p>
+          <a:p>
+            <a:pPr/>
+            <a:r>
+              <a:t>   - `input()` is like your program asking you a question and waiting for your answer.</a:t>
+            </a:r>
+          </a:p>
+          <a:p>
+            <a:pPr/>
+            <a:r>
+              <a:t>**Textbook Example:**</a:t>
+            </a:r>
+          </a:p>
+          <a:p>
+            <a:pPr/>
+            <a:r>
+              <a:t>   `user_name = input('What is your name? ')`</a:t>
+            </a:r>
+          </a:p>
+          <a:p>
+            <a:pPr/>
+            <a:r>
+              <a:t>   `print(f'Nice to meet you, {user_name}!')`</a:t>
+            </a:r>
+          </a:p>
+          <a:p>
+            <a:pPr/>
+            <a:r>
+              <a:t>   `age_str = input('How old are you? ')`</a:t>
+            </a:r>
+          </a:p>
+          <a:p>
+            <a:pPr/>
+            <a:r>
+              <a:t>   `age_int = int(age_str)`  # Convert string to integer for calculations</a:t>
+            </a:r>
+          </a:p>
+          <a:p>
+            <a:pPr/>
+            <a:r>
+              <a:t>   `print(f'In 5 years, you will be {age_int + 5} years old.')`</a:t>
+            </a:r>
+          </a:p>
+          <a:p>
+            <a:pPr/>
+            <a:r>
+              <a:t>**Story Problem:**</a:t>
+            </a:r>
+          </a:p>
+          <a:p>
+            <a:pPr/>
+            <a:r>
+              <a:t>   - Create a simple program that asks the user for two numbers, adds them, and prints the result. Remember to convert the input to numbers!</a:t>
             </a:r>
           </a:p>
         </p:txBody>
@@ -5012,7 +5301,7 @@
           <a:lstStyle/>
           <a:p>
             <a:r>
-              <a:t>Control Flow: Making Decisions with if/elif/else</a:t>
+              <a:t>9. Decision Making: If-Else Statements</a:t>
             </a:r>
           </a:p>
         </p:txBody>
@@ -5033,91 +5322,133 @@
           <a:lstStyle/>
           <a:p>
             <a:r>
-              <a:t>**Concept:** Allows your program to make decisions and execute different blocks of code based on conditions.</a:t>
-            </a:r>
-          </a:p>
-          <a:p>
-            <a:pPr/>
-            <a:r>
-              <a:t>**`if` statement:** Executes code only if a condition is `True`.</a:t>
-            </a:r>
-          </a:p>
-          <a:p>
-            <a:pPr/>
-            <a:r>
-              <a:t>  - **Syntax:** `if condition: </a:t>
-            </a:r>
-            <a:br/>
-            <a:r>
-              <a:t>    # code to execute if condition is True`</a:t>
-            </a:r>
-          </a:p>
-          <a:p>
-            <a:pPr/>
-            <a:r>
-              <a:t>**`else` statement:** Executes code if the `if` condition is `False`.</a:t>
-            </a:r>
-          </a:p>
-          <a:p>
-            <a:pPr/>
-            <a:r>
-              <a:t>  - **Syntax:** `if condition: </a:t>
-            </a:r>
-            <a:br/>
-            <a:r>
-              <a:t>    # code if True </a:t>
-            </a:r>
-            <a:br/>
-            <a:r>
-              <a:t>else: </a:t>
-            </a:r>
-            <a:br/>
-            <a:r>
-              <a:t>    # code if False`</a:t>
-            </a:r>
-          </a:p>
-          <a:p>
-            <a:pPr/>
-            <a:r>
-              <a:t>**`elif` (else if) statement:** Checks additional conditions if the preceding `if`/`elif` conditions are `False`.</a:t>
-            </a:r>
-          </a:p>
-          <a:p>
-            <a:pPr/>
-            <a:r>
-              <a:t>  - **Syntax:** `if condition1: </a:t>
-            </a:r>
-            <a:br/>
-            <a:r>
-              <a:t>    # code if condition1 is True </a:t>
-            </a:r>
-            <a:br/>
-            <a:r>
-              <a:t>elif condition2: </a:t>
-            </a:r>
-            <a:br/>
-            <a:r>
-              <a:t>    # code if condition2 is True </a:t>
-            </a:r>
-            <a:br/>
-            <a:r>
-              <a:t>else: </a:t>
-            </a:r>
-            <a:br/>
-            <a:r>
-              <a:t>    # code if all conditions are False`</a:t>
-            </a:r>
-          </a:p>
-          <a:p>
-            <a:pPr/>
-            <a:r>
-              <a:t>**Indentation:** Crucial in Python; defines code blocks (typically 4 spaces).</a:t>
-            </a:r>
-          </a:p>
-          <a:p>
-            <a:pPr/>
-            <a:r>
-              <a:t>**Real-life Example:** Deciding what to wear based on weather: `if it's cold: wear jacket; elif it's warm: wear t-shirt; else: wear light sweater.`</a:t>
+              <a:t>**Control Flow (Theory):**</a:t>
+            </a:r>
+          </a:p>
+          <a:p>
+            <a:pPr/>
+            <a:r>
+              <a:t>   - Programs don't always run sequentially. Control flow statements allow them to make decisions and execute different blocks of code based on conditions.</a:t>
+            </a:r>
+          </a:p>
+          <a:p>
+            <a:pPr/>
+            <a:r>
+              <a:t>**`if-elif-else` (Theory):**</a:t>
+            </a:r>
+          </a:p>
+          <a:p>
+            <a:pPr/>
+            <a:r>
+              <a:t>   - `if`: Executes a block of code ONLY if a condition is `True`.</a:t>
+            </a:r>
+          </a:p>
+          <a:p>
+            <a:pPr/>
+            <a:r>
+              <a:t>   - `elif` (else if): Checks another condition if the previous `if`/`elif` conditions were `False`.</a:t>
+            </a:r>
+          </a:p>
+          <a:p>
+            <a:pPr/>
+            <a:r>
+              <a:t>   - `else`: Executes a block of code if all preceding `if`/`elif` conditions were `False`.</a:t>
+            </a:r>
+          </a:p>
+          <a:p>
+            <a:pPr/>
+            <a:r>
+              <a:t>   - **Indentation is CRUCIAL in Python!** It defines code blocks.</a:t>
+            </a:r>
+          </a:p>
+          <a:p>
+            <a:pPr/>
+            <a:r>
+              <a:t>**Real-life Analogy:**</a:t>
+            </a:r>
+          </a:p>
+          <a:p>
+            <a:pPr/>
+            <a:r>
+              <a:t>   - Imagine a traffic light: </a:t>
+            </a:r>
+          </a:p>
+          <a:p>
+            <a:pPr/>
+            <a:r>
+              <a:t>     - `if` light is green: **Go**</a:t>
+            </a:r>
+          </a:p>
+          <a:p>
+            <a:pPr/>
+            <a:r>
+              <a:t>     - `elif` light is yellow: **Slow down**</a:t>
+            </a:r>
+          </a:p>
+          <a:p>
+            <a:pPr/>
+            <a:r>
+              <a:t>     - `else` (light must be red): **Stop**</a:t>
+            </a:r>
+          </a:p>
+          <a:p>
+            <a:pPr/>
+            <a:r>
+              <a:t>**Syntax (Textbook Example):**</a:t>
+            </a:r>
+          </a:p>
+          <a:p>
+            <a:pPr/>
+            <a:r>
+              <a:t>   `score = 85`</a:t>
+            </a:r>
+          </a:p>
+          <a:p>
+            <a:pPr/>
+            <a:r>
+              <a:t>   `if score &gt;= 90:`</a:t>
+            </a:r>
+          </a:p>
+          <a:p>
+            <a:pPr/>
+            <a:r>
+              <a:t>   `    print('Grade A')`</a:t>
+            </a:r>
+          </a:p>
+          <a:p>
+            <a:pPr/>
+            <a:r>
+              <a:t>   `elif score &gt;= 80:`</a:t>
+            </a:r>
+          </a:p>
+          <a:p>
+            <a:pPr/>
+            <a:r>
+              <a:t>   `    print('Grade B')`</a:t>
+            </a:r>
+          </a:p>
+          <a:p>
+            <a:pPr/>
+            <a:r>
+              <a:t>   `else:`</a:t>
+            </a:r>
+          </a:p>
+          <a:p>
+            <a:pPr/>
+            <a:r>
+              <a:t>   `    print('Grade C')`</a:t>
+            </a:r>
+          </a:p>
+          <a:p>
+            <a:pPr/>
+            <a:r>
+              <a:t>**Story Problem:**</a:t>
+            </a:r>
+          </a:p>
+          <a:p>
+            <a:pPr/>
+            <a:r>
+              <a:t>   - Write a program that asks a user for their age. If they are 18 or older, print 'You are an adult.' If they are under 18 but 13 or older, print 'You are a teenager.' Otherwise, print 'You are a child.'</a:t>
             </a:r>
           </a:p>
         </p:txBody>

</xml_diff>

<commit_message>
Fixed PPT Generation Problem
</commit_message>
<xml_diff>
--- a/data/output.pptx
+++ b/data/output.pptx
@@ -15,8 +15,6 @@
     <p:sldId id="263" r:id="rId14"/>
     <p:sldId id="264" r:id="rId15"/>
     <p:sldId id="265" r:id="rId16"/>
-    <p:sldId id="266" r:id="rId17"/>
-    <p:sldId id="267" r:id="rId18"/>
   </p:sldIdLst>
   <p:sldSz cx="9144000" cy="6858000" type="screen4x3"/>
   <p:notesSz cx="6858000" cy="9144000"/>
@@ -3115,7 +3113,7 @@
           <a:lstStyle/>
           <a:p>
             <a:r>
-              <a:t>Welcome to Python: Your First Step into Coding!</a:t>
+              <a:t>Introduction to Computer Vision: Teaching Machines to See</a:t>
             </a:r>
           </a:p>
         </p:txBody>
@@ -3136,25 +3134,25 @@
           <a:lstStyle/>
           <a:p>
             <a:r>
-              <a:t>**Overview**: A high-level introduction to Python and its significance in modern computing.</a:t>
-            </a:r>
-          </a:p>
-          <a:p>
-            <a:pPr/>
-            <a:r>
-              <a:t>**What is Python?**: An interpreted, high-level, general-purpose programming language.</a:t>
-            </a:r>
-          </a:p>
-          <a:p>
-            <a:pPr/>
-            <a:r>
-              <a:t>**Why Python?**: Simplicity, Readability, Versatility, Large Community &amp; Ecosystem.</a:t>
-            </a:r>
-          </a:p>
-          <a:p>
-            <a:pPr/>
-            <a:r>
-              <a:t>**Real-world Applications**: Web Development (Django, Flask), Data Science (Pandas, NumPy), Artificial Intelligence/Machine Learning (TensorFlow, PyTorch), Automation, IoT, Game Development.</a:t>
+              <a:t>What is Computer Vision (CV)? – The science of enabling computers to 'see', interpret, and understand the visual world.</a:t>
+            </a:r>
+          </a:p>
+          <a:p>
+            <a:pPr/>
+            <a:r>
+              <a:t>Core Goal: To replicate the human visual system's ability to process, analyze, and make decisions from images and videos.</a:t>
+            </a:r>
+          </a:p>
+          <a:p>
+            <a:pPr/>
+            <a:r>
+              <a:t>Why is it Important? – Bridging the gap between the digital world of pixels and the real-world understanding needed for automation and intelligence.</a:t>
+            </a:r>
+          </a:p>
+          <a:p>
+            <a:pPr/>
+            <a:r>
+              <a:t>The Role of Deep Learning: Modern CV is largely driven by Deep Learning, allowing unprecedented accuracy and complexity in visual tasks.</a:t>
             </a:r>
           </a:p>
         </p:txBody>
@@ -3193,7 +3191,7 @@
           <a:lstStyle/>
           <a:p>
             <a:r>
-              <a:t>Functions: Reusable Blocks of Code</a:t>
+              <a:t>Why Preprocessing Matters for Deep Learning Performance</a:t>
             </a:r>
           </a:p>
         </p:txBody>
@@ -3214,319 +3212,37 @@
           <a:lstStyle/>
           <a:p>
             <a:r>
-              <a:t>**Functions**: Self-contained blocks of code that perform a specific task.</a:t>
-            </a:r>
-          </a:p>
-          <a:p>
-            <a:pPr/>
-            <a:r>
-              <a:t>**Why Use Functions?**</a:t>
-            </a:r>
-          </a:p>
-          <a:p>
-            <a:pPr/>
-            <a:r>
-              <a:t>  - **Modularity**: Break down complex problems into smaller, manageable pieces.</a:t>
-            </a:r>
-          </a:p>
-          <a:p>
-            <a:pPr/>
-            <a:r>
-              <a:t>  - **Reusability**: Write code once and use it multiple times.</a:t>
-            </a:r>
-          </a:p>
-          <a:p>
-            <a:pPr/>
-            <a:r>
-              <a:t>  - **Readability**: Make your code easier to understand and debug.</a:t>
-            </a:r>
-          </a:p>
-          <a:p>
-            <a:pPr/>
-            <a:r>
-              <a:t>**Defining a Function**: Using the `def` keyword.</a:t>
-            </a:r>
-          </a:p>
-          <a:p>
-            <a:pPr/>
-            <a:r>
-              <a:t>  - `def greet(name):`</a:t>
-            </a:r>
-          </a:p>
-          <a:p>
-            <a:pPr/>
-            <a:r>
-              <a:t>  - `    print(f'Hello, {name}!')`</a:t>
-            </a:r>
-          </a:p>
-          <a:p>
-            <a:pPr/>
-            <a:r>
-              <a:t>  - **Parameters**: Variables listed inside the parentheses in the function definition (e.g., `name`).</a:t>
-            </a:r>
-          </a:p>
-          <a:p>
-            <a:pPr/>
-            <a:r>
-              <a:t>**Calling a Function**: Executing the function's code.</a:t>
-            </a:r>
-          </a:p>
-          <a:p>
-            <a:pPr/>
-            <a:r>
-              <a:t>  - `greet('Alice')`</a:t>
-            </a:r>
-          </a:p>
-          <a:p>
-            <a:pPr/>
-            <a:r>
-              <a:t>  - **Arguments**: The actual values passed to the function when it's called (e.g., `'Alice'`).</a:t>
-            </a:r>
-          </a:p>
-          <a:p>
-            <a:pPr/>
-            <a:r>
-              <a:t>**Return Values**: Functions can send back results using the `return` keyword.</a:t>
-            </a:r>
-          </a:p>
-          <a:p>
-            <a:pPr/>
-            <a:r>
-              <a:t>  - `def add(a, b):`</a:t>
-            </a:r>
-          </a:p>
-          <a:p>
-            <a:pPr/>
-            <a:r>
-              <a:t>  - `    return a + b`</a:t>
-            </a:r>
-          </a:p>
-          <a:p>
-            <a:pPr/>
-            <a:r>
-              <a:t>  - `result = add(5, 3)`  # `result` will be 8</a:t>
-            </a:r>
-          </a:p>
-          <a:p>
-            <a:pPr/>
-            <a:r>
-              <a:t>**Real-life Example**: A function to calculate the area of a circle, validate a user's password, or convert units.</a:t>
-            </a:r>
-          </a:p>
-        </p:txBody>
-      </p:sp>
-    </p:spTree>
-  </p:cSld>
-  <p:clrMapOvr>
-    <a:masterClrMapping/>
-  </p:clrMapOvr>
-</p:sld>
-</file>
-
-<file path=ppt/slides/slide11.xml><?xml version="1.0" encoding="utf-8"?>
-<p:sld xmlns:a="http://schemas.openxmlformats.org/drawingml/2006/main" xmlns:p="http://schemas.openxmlformats.org/presentationml/2006/main" xmlns:r="http://schemas.openxmlformats.org/officeDocument/2006/relationships">
-  <p:cSld>
-    <p:spTree>
-      <p:nvGrpSpPr>
-        <p:cNvPr id="1" name=""/>
-        <p:cNvGrpSpPr/>
-        <p:nvPr/>
-      </p:nvGrpSpPr>
-      <p:grpSpPr/>
-      <p:sp>
-        <p:nvSpPr>
-          <p:cNvPr id="2" name="Title 1"/>
-          <p:cNvSpPr>
-            <a:spLocks noGrp="1"/>
-          </p:cNvSpPr>
-          <p:nvPr>
-            <p:ph type="title"/>
-          </p:nvPr>
-        </p:nvSpPr>
-        <p:spPr/>
-        <p:txBody>
-          <a:bodyPr/>
-          <a:lstStyle/>
-          <a:p>
-            <a:r>
-              <a:t>Beyond the Basics: What's Next &amp; Interview Corner</a:t>
-            </a:r>
-          </a:p>
-        </p:txBody>
-      </p:sp>
-      <p:sp>
-        <p:nvSpPr>
-          <p:cNvPr id="3" name="Content Placeholder 2"/>
-          <p:cNvSpPr>
-            <a:spLocks noGrp="1"/>
-          </p:cNvSpPr>
-          <p:nvPr>
-            <p:ph idx="1"/>
-          </p:nvPr>
-        </p:nvSpPr>
-        <p:spPr/>
-        <p:txBody>
-          <a:bodyPr/>
-          <a:lstStyle/>
-          <a:p>
-            <a:r>
-              <a:t>**What's Next in Python?**</a:t>
-            </a:r>
-          </a:p>
-          <a:p>
-            <a:pPr/>
-            <a:r>
-              <a:t>  - **Modules &amp; Packages**: Organizing code into reusable files and directories.</a:t>
-            </a:r>
-          </a:p>
-          <a:p>
-            <a:pPr/>
-            <a:r>
-              <a:t>  - **File I/O**: Reading from and writing to files.</a:t>
-            </a:r>
-          </a:p>
-          <a:p>
-            <a:pPr/>
-            <a:r>
-              <a:t>  - **Error Handling**: Using `try-except` blocks to manage unexpected issues.</a:t>
-            </a:r>
-          </a:p>
-          <a:p>
-            <a:pPr/>
-            <a:r>
-              <a:t>  - **Object-Oriented Programming (OOP)**: Classes and Objects.</a:t>
-            </a:r>
-          </a:p>
-          <a:p>
-            <a:pPr/>
-            <a:r>
-              <a:t>  - **Libraries**: Exploring powerful external libraries (e.g., `requests` for web, `matplotlib` for plotting).</a:t>
-            </a:r>
-          </a:p>
-          <a:p>
-            <a:pPr/>
-            <a:r>
-              <a:t>**Interview Corner: Key Concepts to Master for Beginners**</a:t>
-            </a:r>
-          </a:p>
-          <a:p>
-            <a:pPr/>
-            <a:r>
-              <a:t>  - **Difference between `list` and `tuple`?** (Mutability)</a:t>
-            </a:r>
-          </a:p>
-          <a:p>
-            <a:pPr/>
-            <a:r>
-              <a:t>  - **What is dynamic typing?**</a:t>
-            </a:r>
-          </a:p>
-          <a:p>
-            <a:pPr/>
-            <a:r>
-              <a:t>  - **Explain indentation in Python.**</a:t>
-            </a:r>
-          </a:p>
-          <a:p>
-            <a:pPr/>
-            <a:r>
-              <a:t>  - **How do `for` and `while` loops differ?**</a:t>
-            </a:r>
-          </a:p>
-          <a:p>
-            <a:pPr/>
-            <a:r>
-              <a:t>  - **What is the purpose of a function?**</a:t>
-            </a:r>
-          </a:p>
-          <a:p>
-            <a:pPr/>
-            <a:r>
-              <a:t>  - **Difference between `==` and `=`?** (Comparison vs. Assignment)</a:t>
-            </a:r>
-          </a:p>
-        </p:txBody>
-      </p:sp>
-    </p:spTree>
-  </p:cSld>
-  <p:clrMapOvr>
-    <a:masterClrMapping/>
-  </p:clrMapOvr>
-</p:sld>
-</file>
-
-<file path=ppt/slides/slide12.xml><?xml version="1.0" encoding="utf-8"?>
-<p:sld xmlns:a="http://schemas.openxmlformats.org/drawingml/2006/main" xmlns:p="http://schemas.openxmlformats.org/presentationml/2006/main" xmlns:r="http://schemas.openxmlformats.org/officeDocument/2006/relationships">
-  <p:cSld>
-    <p:spTree>
-      <p:nvGrpSpPr>
-        <p:cNvPr id="1" name=""/>
-        <p:cNvGrpSpPr/>
-        <p:nvPr/>
-      </p:nvGrpSpPr>
-      <p:grpSpPr/>
-      <p:sp>
-        <p:nvSpPr>
-          <p:cNvPr id="2" name="Title 1"/>
-          <p:cNvSpPr>
-            <a:spLocks noGrp="1"/>
-          </p:cNvSpPr>
-          <p:nvPr>
-            <p:ph type="title"/>
-          </p:nvPr>
-        </p:nvSpPr>
-        <p:spPr/>
-        <p:txBody>
-          <a:bodyPr/>
-          <a:lstStyle/>
-          <a:p>
-            <a:r>
-              <a:t>Q&amp;A and Next Steps</a:t>
-            </a:r>
-          </a:p>
-        </p:txBody>
-      </p:sp>
-      <p:sp>
-        <p:nvSpPr>
-          <p:cNvPr id="3" name="Content Placeholder 2"/>
-          <p:cNvSpPr>
-            <a:spLocks noGrp="1"/>
-          </p:cNvSpPr>
-          <p:nvPr>
-            <p:ph idx="1"/>
-          </p:nvPr>
-        </p:nvSpPr>
-        <p:spPr/>
-        <p:txBody>
-          <a:bodyPr/>
-          <a:lstStyle/>
-          <a:p>
-            <a:r>
-              <a:t>**Questions &amp; Discussion**</a:t>
-            </a:r>
-          </a:p>
-          <a:p>
-            <a:pPr/>
-            <a:r>
-              <a:t>**Practice, Practice, Practice!**: The best way to learn programming is by doing.</a:t>
-            </a:r>
-          </a:p>
-          <a:p>
-            <a:pPr/>
-            <a:r>
-              <a:t>  - Solve coding challenges (e.g., HackerRank, LeetCode - beginner level).</a:t>
-            </a:r>
-          </a:p>
-          <a:p>
-            <a:pPr/>
-            <a:r>
-              <a:t>  - Work on small personal projects.</a:t>
-            </a:r>
-          </a:p>
-          <a:p>
-            <a:pPr/>
-            <a:r>
-              <a:t>**Explore Resources**: Official Python documentation, online tutorials (Codecademy, freeCodeCamp), books.</a:t>
+              <a:t>Improved Accuracy: Clean, consistent data leads to better feature learning and more accurate model predictions.</a:t>
+            </a:r>
+          </a:p>
+          <a:p>
+            <a:pPr/>
+            <a:r>
+              <a:t>Faster Convergence: Normalized data helps optimization algorithms find the optimal solution more quickly.</a:t>
+            </a:r>
+          </a:p>
+          <a:p>
+            <a:pPr/>
+            <a:r>
+              <a:t>Enhanced Generalization: Augmentation exposes the model to more variations, making it robust to new, unseen data.</a:t>
+            </a:r>
+          </a:p>
+          <a:p>
+            <a:pPr/>
+            <a:r>
+              <a:t>Reduced Training Time: Smaller, standardized images can be processed faster by the network.</a:t>
+            </a:r>
+          </a:p>
+          <a:p>
+            <a:pPr/>
+            <a:r>
+              <a:t>Handling Data Variability: Compensates for differences in lighting, camera settings, and other real-world factors.</a:t>
+            </a:r>
+          </a:p>
+          <a:p>
+            <a:pPr/>
+            <a:r>
+              <a:t>Foundation for Success: It's the essential first step that sets up any Computer Vision project for success.</a:t>
             </a:r>
           </a:p>
         </p:txBody>
@@ -3565,7 +3281,7 @@
           <a:lstStyle/>
           <a:p>
             <a:r>
-              <a:t>Setting Up Your Python Environment</a:t>
+              <a:t>The Building Blocks of Vision: Images &amp; Pixels</a:t>
             </a:r>
           </a:p>
         </p:txBody>
@@ -3586,49 +3302,25 @@
           <a:lstStyle/>
           <a:p>
             <a:r>
-              <a:t>**Installation**: How to get Python on your machine (briefly mention python.org, Anaconda).</a:t>
-            </a:r>
-          </a:p>
-          <a:p>
-            <a:pPr/>
-            <a:r>
-              <a:t>**Integrated Development Environments (IDEs)**: Tools that make coding easier.</a:t>
-            </a:r>
-          </a:p>
-          <a:p>
-            <a:pPr/>
-            <a:r>
-              <a:t>  - **VS Code**: Lightweight, versatile, popular.</a:t>
-            </a:r>
-          </a:p>
-          <a:p>
-            <a:pPr/>
-            <a:r>
-              <a:t>  - **PyCharm**: Feature-rich, specifically for Python.</a:t>
-            </a:r>
-          </a:p>
-          <a:p>
-            <a:pPr/>
-            <a:r>
-              <a:t>  - **Jupyter Notebooks**: Excellent for data exploration and interactive coding.</a:t>
-            </a:r>
-          </a:p>
-          <a:p>
-            <a:pPr/>
-            <a:r>
-              <a:t>**Your First Program: 'Hello, World!'**</a:t>
-            </a:r>
-          </a:p>
-          <a:p>
-            <a:pPr/>
-            <a:r>
-              <a:t>  - `print('Hello, World!')`</a:t>
-            </a:r>
-          </a:p>
-          <a:p>
-            <a:pPr/>
-            <a:r>
-              <a:t>  - **Concept**: The fundamental output statement to display text.</a:t>
+              <a:t>What is a Digital Image? – A grid (matrix) of numerical values, each representing a tiny point of light.</a:t>
+            </a:r>
+          </a:p>
+          <a:p>
+            <a:pPr/>
+            <a:r>
+              <a:t>Pixels: The Smallest Unit – Short for 'picture element', a pixel is the fundamental building block of any digital image.</a:t>
+            </a:r>
+          </a:p>
+          <a:p>
+            <a:pPr/>
+            <a:r>
+              <a:t>Pixel Values: Each pixel holds a numerical value representing its color and intensity.</a:t>
+            </a:r>
+          </a:p>
+          <a:p>
+            <a:pPr/>
+            <a:r>
+              <a:t>Image Representation: Typically, images are represented in color channels (e.g., RGB for Red, Green, Blue) or as grayscale (intensity only).</a:t>
             </a:r>
           </a:p>
         </p:txBody>
@@ -3667,7 +3359,7 @@
           <a:lstStyle/>
           <a:p>
             <a:r>
-              <a:t>Python Basics: Syntax &amp; Comments</a:t>
+              <a:t>Journey of Computer Vision: From Pixels to Understanding</a:t>
             </a:r>
           </a:p>
         </p:txBody>
@@ -3688,43 +3380,37 @@
           <a:lstStyle/>
           <a:p>
             <a:r>
-              <a:t>**Basic Syntax**: Python's structure emphasizes readability.</a:t>
-            </a:r>
-          </a:p>
-          <a:p>
-            <a:pPr/>
-            <a:r>
-              <a:t>  - **Indentation**: Crucial for defining code blocks (e.g., inside loops, functions). Python uses whitespace, not braces {}!</a:t>
-            </a:r>
-          </a:p>
-          <a:p>
-            <a:pPr/>
-            <a:r>
-              <a:t>  - **Statements**: Instructions executed by the Python interpreter.</a:t>
-            </a:r>
-          </a:p>
-          <a:p>
-            <a:pPr/>
-            <a:r>
-              <a:t>**Comments**: Essential for code understanding and maintenance.</a:t>
-            </a:r>
-          </a:p>
-          <a:p>
-            <a:pPr/>
-            <a:r>
-              <a:t>  - **Single-line comments**: Start with `#` (e.g., `# This is a comment`).</a:t>
-            </a:r>
-          </a:p>
-          <a:p>
-            <a:pPr/>
-            <a:r>
-              <a:t>  - **Multi-line comments (Docstrings)**: Enclosed in triple quotes (`'''...'''` or `"""..."""`), often used for function/module documentation.</a:t>
-            </a:r>
-          </a:p>
-          <a:p>
-            <a:pPr/>
-            <a:r>
-              <a:t>**Real-life Application**: Good comments make code easier to collaborate on and debug, like leaving notes in a recipe.</a:t>
+              <a:t>Image Acquisition: Capturing images from the real world using cameras or sensors.</a:t>
+            </a:r>
+          </a:p>
+          <a:p>
+            <a:pPr/>
+            <a:r>
+              <a:t>Image Preprocessing: Preparing images for analysis by cleaning, enhancing, and standardizing them (our next topic!).</a:t>
+            </a:r>
+          </a:p>
+          <a:p>
+            <a:pPr/>
+            <a:r>
+              <a:t>Feature Extraction: Identifying important patterns, shapes, and textures within the image.</a:t>
+            </a:r>
+          </a:p>
+          <a:p>
+            <a:pPr/>
+            <a:r>
+              <a:t>Image Understanding/Analysis: Interpreting these features to make sense of the image content (e.g., 'this is a cat', 'this is a car').</a:t>
+            </a:r>
+          </a:p>
+          <a:p>
+            <a:pPr/>
+            <a:r>
+              <a:t>Brief History: From early rule-based systems to today's data-driven Deep Learning approaches.</a:t>
+            </a:r>
+          </a:p>
+          <a:p>
+            <a:pPr/>
+            <a:r>
+              <a:t>Challenges: Variability in lighting, viewpoints, occlusions, and the sheer complexity of real-world scenes.</a:t>
             </a:r>
           </a:p>
         </p:txBody>
@@ -3763,7 +3449,7 @@
           <a:lstStyle/>
           <a:p>
             <a:r>
-              <a:t>Variables &amp; Data Types: Storing Information</a:t>
+              <a:t>Real-World Impact of Computer Vision: Seeing is Believing</a:t>
             </a:r>
           </a:p>
         </p:txBody>
@@ -3784,61 +3470,37 @@
           <a:lstStyle/>
           <a:p>
             <a:r>
-              <a:t>**Variables**: Named storage locations for data.</a:t>
-            </a:r>
-          </a:p>
-          <a:p>
-            <a:pPr/>
-            <a:r>
-              <a:t>  - **Declaration**: Simply assign a value (e.g., `age = 20`, `name = 'Alice'`).</a:t>
-            </a:r>
-          </a:p>
-          <a:p>
-            <a:pPr/>
-            <a:r>
-              <a:t>  - **Naming Rules**: Start with letter or underscore, can contain numbers, case-sensitive (e.g., `myVar` is different from `myvar`).</a:t>
-            </a:r>
-          </a:p>
-          <a:p>
-            <a:pPr/>
-            <a:r>
-              <a:t>**Data Types**: Classify the kind of values a variable can hold.</a:t>
-            </a:r>
-          </a:p>
-          <a:p>
-            <a:pPr/>
-            <a:r>
-              <a:t>  - **Integers (`int`)**: Whole numbers (e.g., `10`, `-5`, `0`).</a:t>
-            </a:r>
-          </a:p>
-          <a:p>
-            <a:pPr/>
-            <a:r>
-              <a:t>  - **Floating-Point Numbers (`float`)**: Decimal numbers (e.g., `3.14`, `-0.5`).</a:t>
-            </a:r>
-          </a:p>
-          <a:p>
-            <a:pPr/>
-            <a:r>
-              <a:t>  - **Strings (`str`)**: Sequences of characters (text) enclosed in single or double quotes (e.g., `'hello'`, `"Python"`).</a:t>
-            </a:r>
-          </a:p>
-          <a:p>
-            <a:pPr/>
-            <a:r>
-              <a:t>  - **Booleans (`bool`)**: Represent truth values: `True` or `False` (e.g., `is_active = True`).</a:t>
-            </a:r>
-          </a:p>
-          <a:p>
-            <a:pPr/>
-            <a:r>
-              <a:t>**Concept: Dynamic Typing**: Python automatically infers the data type based on the assigned value. No explicit type declaration needed!</a:t>
-            </a:r>
-          </a:p>
-          <a:p>
-            <a:pPr/>
-            <a:r>
-              <a:t>**Real-life Example**: Storing a student's ID (int), GPA (float), name (str), and enrollment status (bool).</a:t>
+              <a:t>Autonomous Vehicles: Recognizing traffic signs, pedestrians, other vehicles, and lane markings.</a:t>
+            </a:r>
+          </a:p>
+          <a:p>
+            <a:pPr/>
+            <a:r>
+              <a:t>Facial Recognition: Unlocking phones, security systems, identifying individuals.</a:t>
+            </a:r>
+          </a:p>
+          <a:p>
+            <a:pPr/>
+            <a:r>
+              <a:t>Medical Imaging Analysis: Detecting diseases (e.g., tumors in X-rays, anomalies in MRI scans), assisting diagnosis.</a:t>
+            </a:r>
+          </a:p>
+          <a:p>
+            <a:pPr/>
+            <a:r>
+              <a:t>Industrial Automation: Quality control, robotic guidance, assembly line inspection.</a:t>
+            </a:r>
+          </a:p>
+          <a:p>
+            <a:pPr/>
+            <a:r>
+              <a:t>Augmented Reality (AR) / Virtual Reality (VR): Overlaying digital information onto the real world, tracking user movements.</a:t>
+            </a:r>
+          </a:p>
+          <a:p>
+            <a:pPr/>
+            <a:r>
+              <a:t>Security &amp; Surveillance: Anomaly detection, crowd monitoring.</a:t>
             </a:r>
           </a:p>
         </p:txBody>
@@ -3877,7 +3539,7 @@
           <a:lstStyle/>
           <a:p>
             <a:r>
-              <a:t>Operators: Performing Actions on Data</a:t>
+              <a:t>Image Preprocessing: Preparing Images for AI</a:t>
             </a:r>
           </a:p>
         </p:txBody>
@@ -3898,109 +3560,43 @@
           <a:lstStyle/>
           <a:p>
             <a:r>
-              <a:t>**Operators**: Special symbols that perform operations on values and variables.</a:t>
-            </a:r>
-          </a:p>
-          <a:p>
-            <a:pPr/>
-            <a:r>
-              <a:t>**1. Arithmetic Operators**: For mathematical calculations.</a:t>
-            </a:r>
-          </a:p>
-          <a:p>
-            <a:pPr/>
-            <a:r>
-              <a:t>  - `+` (Addition), `-` (Subtraction), `*` (Multiplication), `/` (Division)</a:t>
-            </a:r>
-          </a:p>
-          <a:p>
-            <a:pPr/>
-            <a:r>
-              <a:t>  - `//` (Floor Division: result without remainder), `%` (Modulo: remainder)</a:t>
-            </a:r>
-          </a:p>
-          <a:p>
-            <a:pPr/>
-            <a:r>
-              <a:t>  - `**` (Exponentiation: power)</a:t>
-            </a:r>
-          </a:p>
-          <a:p>
-            <a:pPr/>
-            <a:r>
-              <a:t>  - **Example**: Calculating total cost, finding odd/even numbers using modulo.</a:t>
-            </a:r>
-          </a:p>
-          <a:p>
-            <a:pPr/>
-            <a:r>
-              <a:t>**2. Comparison Operators**: For comparing values, result is a boolean (`True`/`False`).</a:t>
-            </a:r>
-          </a:p>
-          <a:p>
-            <a:pPr/>
-            <a:r>
-              <a:t>  - `==` (Equal to), `!=` (Not equal to)</a:t>
-            </a:r>
-          </a:p>
-          <a:p>
-            <a:pPr/>
-            <a:r>
-              <a:t>  - `&gt;` (Greater than), `&lt;` (Less than), `&gt;=` (Greater than or equal to), `&lt;=` (Less than or equal to)</a:t>
-            </a:r>
-          </a:p>
-          <a:p>
-            <a:pPr/>
-            <a:r>
-              <a:t>  - **Example**: Checking if a user's age is greater than 18.</a:t>
-            </a:r>
-          </a:p>
-          <a:p>
-            <a:pPr/>
-            <a:r>
-              <a:t>**3. Logical Operators**: Combine conditional statements.</a:t>
-            </a:r>
-          </a:p>
-          <a:p>
-            <a:pPr/>
-            <a:r>
-              <a:t>  - `and`: Both conditions must be `True`.</a:t>
-            </a:r>
-          </a:p>
-          <a:p>
-            <a:pPr/>
-            <a:r>
-              <a:t>  - `or`: At least one condition must be `True`.</a:t>
-            </a:r>
-          </a:p>
-          <a:p>
-            <a:pPr/>
-            <a:r>
-              <a:t>  - `not`: Reverses the boolean result.</a:t>
-            </a:r>
-          </a:p>
-          <a:p>
-            <a:pPr/>
-            <a:r>
-              <a:t>  - **Example**: Granting access if `(username_correct and password_correct)`.</a:t>
-            </a:r>
-          </a:p>
-          <a:p>
-            <a:pPr/>
-            <a:r>
-              <a:t>**4. Assignment Operators**: Assign values to variables.</a:t>
-            </a:r>
-          </a:p>
-          <a:p>
-            <a:pPr/>
-            <a:r>
-              <a:t>  - `=` (Simple assignment), `+=` (Add and assign), `-=` (Subtract and assign), etc.</a:t>
-            </a:r>
-          </a:p>
-          <a:p>
-            <a:pPr/>
-            <a:r>
-              <a:t>  - **Example**: `counter += 1` is shorthand for `counter = counter + 1`.</a:t>
+              <a:t>What is Image Preprocessing? – A set of operations performed on raw images to make them more suitable for subsequent analysis by Computer Vision models.</a:t>
+            </a:r>
+          </a:p>
+          <a:p>
+            <a:pPr/>
+            <a:r>
+              <a:t>Why is it Crucial? – Raw images often contain noise, variations, or are in formats unsuitable for direct model input.</a:t>
+            </a:r>
+          </a:p>
+          <a:p>
+            <a:pPr/>
+            <a:r>
+              <a:t>Primary Goals: </a:t>
+            </a:r>
+          </a:p>
+          <a:p>
+            <a:pPr/>
+            <a:r>
+              <a:t>1. Enhancement: Improving the visual quality or making certain features stand out.</a:t>
+            </a:r>
+          </a:p>
+          <a:p>
+            <a:pPr/>
+            <a:r>
+              <a:t>2. Normalization: Standardizing image properties (size, color range).</a:t>
+            </a:r>
+          </a:p>
+          <a:p>
+            <a:pPr/>
+            <a:r>
+              <a:t>3. Noise Reduction: Removing unwanted disturbances that can confuse models.</a:t>
+            </a:r>
+          </a:p>
+          <a:p>
+            <a:pPr/>
+            <a:r>
+              <a:t>4. Augmentation: Artificially expanding the dataset to improve model generalization (especially for Deep Learning).</a:t>
             </a:r>
           </a:p>
         </p:txBody>
@@ -4039,7 +3635,7 @@
           <a:lstStyle/>
           <a:p>
             <a:r>
-              <a:t>Input &amp; Output: Interacting with Your Program</a:t>
+              <a:t>Essential Preprocessing Techniques: Part 1</a:t>
             </a:r>
           </a:p>
         </p:txBody>
@@ -4060,67 +3656,49 @@
           <a:lstStyle/>
           <a:p>
             <a:r>
-              <a:t>**1. Output: The `print()` Function**</a:t>
-            </a:r>
-          </a:p>
-          <a:p>
-            <a:pPr/>
-            <a:r>
-              <a:t>  - **Purpose**: Display information, results, or messages to the console.</a:t>
-            </a:r>
-          </a:p>
-          <a:p>
-            <a:pPr/>
-            <a:r>
-              <a:t>  - **Syntax**: `print(value1, value2, ..., sep=' ', end='\n')`</a:t>
-            </a:r>
-          </a:p>
-          <a:p>
-            <a:pPr/>
-            <a:r>
-              <a:t>  - `sep`: Separator between values (default is space).</a:t>
-            </a:r>
-          </a:p>
-          <a:p>
-            <a:pPr/>
-            <a:r>
-              <a:t>  - `end`: Character appended at the end (default is newline).</a:t>
-            </a:r>
-          </a:p>
-          <a:p>
-            <a:pPr/>
-            <a:r>
-              <a:t>  - **Real-life Example**: Showing a user's calculated bill or a game score.</a:t>
-            </a:r>
-          </a:p>
-          <a:p>
-            <a:pPr/>
-            <a:r>
-              <a:t>**2. Input: The `input()` Function**</a:t>
-            </a:r>
-          </a:p>
-          <a:p>
-            <a:pPr/>
-            <a:r>
-              <a:t>  - **Purpose**: Get data/text from the user via the console.</a:t>
-            </a:r>
-          </a:p>
-          <a:p>
-            <a:pPr/>
-            <a:r>
-              <a:t>  - **Syntax**: `variable = input('Prompt message: ')`</a:t>
-            </a:r>
-          </a:p>
-          <a:p>
-            <a:pPr/>
-            <a:r>
-              <a:t>  - **Important**: `input()` always returns a string. You might need to convert it using `int()`, `float()`, etc., if expecting numbers.</a:t>
-            </a:r>
-          </a:p>
-          <a:p>
-            <a:pPr/>
-            <a:r>
-              <a:t>  - **Real-life Example**: Asking the user for their name, age, or choices in an interactive program.</a:t>
+              <a:t>1. Grayscale Conversion:</a:t>
+            </a:r>
+          </a:p>
+          <a:p>
+            <a:pPr/>
+            <a:r>
+              <a:t>   - Theory: Converts a color image (e.g., RGB) into a single-channel image representing intensity.</a:t>
+            </a:r>
+          </a:p>
+          <a:p>
+            <a:pPr/>
+            <a:r>
+              <a:t>   - Application: Reduces computational complexity, often sufficient for tasks where color isn't a distinguishing feature (e.g., edge detection).</a:t>
+            </a:r>
+          </a:p>
+          <a:p>
+            <a:pPr/>
+            <a:r>
+              <a:t>   - Real-Life Example: Document scanning, some medical image analyses.</a:t>
+            </a:r>
+          </a:p>
+          <a:p>
+            <a:pPr/>
+            <a:r>
+              <a:t>2. Resizing/Scaling:</a:t>
+            </a:r>
+          </a:p>
+          <a:p>
+            <a:pPr/>
+            <a:r>
+              <a:t>   - Theory: Changing the dimensions (width and height) of an image.</a:t>
+            </a:r>
+          </a:p>
+          <a:p>
+            <a:pPr/>
+            <a:r>
+              <a:t>   - Application: Standardizing input size for Deep Learning models, reducing memory usage, or focusing on regions of interest.</a:t>
+            </a:r>
+          </a:p>
+          <a:p>
+            <a:pPr/>
+            <a:r>
+              <a:t>   - Real-Life Example: Preparing images for a neural network that expects a fixed input size (e.g., 224x224 pixels).</a:t>
             </a:r>
           </a:p>
         </p:txBody>
@@ -4159,7 +3737,7 @@
           <a:lstStyle/>
           <a:p>
             <a:r>
-              <a:t>Control Flow - Conditionals: Making Decisions</a:t>
+              <a:t>Essential Preprocessing Techniques: Part 2</a:t>
             </a:r>
           </a:p>
         </p:txBody>
@@ -4180,115 +3758,49 @@
           <a:lstStyle/>
           <a:p>
             <a:r>
-              <a:t>**Control Flow**: The order in which the program's instructions are executed.</a:t>
-            </a:r>
-          </a:p>
-          <a:p>
-            <a:pPr/>
-            <a:r>
-              <a:t>**Conditional Statements (`if`, `elif`, `else`)**: Allow your program to make decisions based on conditions.</a:t>
-            </a:r>
-          </a:p>
-          <a:p>
-            <a:pPr/>
-            <a:r>
-              <a:t>**1. `if` Statement**: Executes a block of code ONLY if a condition is `True`.</a:t>
-            </a:r>
-          </a:p>
-          <a:p>
-            <a:pPr/>
-            <a:r>
-              <a:t>  - `if condition:`</a:t>
-            </a:r>
-          </a:p>
-          <a:p>
-            <a:pPr/>
-            <a:r>
-              <a:t>  - `    # code to execute`</a:t>
-            </a:r>
-          </a:p>
-          <a:p>
-            <a:pPr/>
-            <a:r>
-              <a:t>**2. `if-else` Statement**: Executes one block if condition is `True`, another if `False`.</a:t>
-            </a:r>
-          </a:p>
-          <a:p>
-            <a:pPr/>
-            <a:r>
-              <a:t>  - `if condition:`</a:t>
-            </a:r>
-          </a:p>
-          <a:p>
-            <a:pPr/>
-            <a:r>
-              <a:t>  - `    # code for True`</a:t>
-            </a:r>
-          </a:p>
-          <a:p>
-            <a:pPr/>
-            <a:r>
-              <a:t>  - `else:`</a:t>
-            </a:r>
-          </a:p>
-          <a:p>
-            <a:pPr/>
-            <a:r>
-              <a:t>  - `    # code for False`</a:t>
-            </a:r>
-          </a:p>
-          <a:p>
-            <a:pPr/>
-            <a:r>
-              <a:t>**3. `if-elif-else` Statement**: For multiple conditions (like a chain of choices).</a:t>
-            </a:r>
-          </a:p>
-          <a:p>
-            <a:pPr/>
-            <a:r>
-              <a:t>  - `if condition1:`</a:t>
-            </a:r>
-          </a:p>
-          <a:p>
-            <a:pPr/>
-            <a:r>
-              <a:t>  - `    # code for condition1`</a:t>
-            </a:r>
-          </a:p>
-          <a:p>
-            <a:pPr/>
-            <a:r>
-              <a:t>  - `elif condition2:`</a:t>
-            </a:r>
-          </a:p>
-          <a:p>
-            <a:pPr/>
-            <a:r>
-              <a:t>  - `    # code for condition2`</a:t>
-            </a:r>
-          </a:p>
-          <a:p>
-            <a:pPr/>
-            <a:r>
-              <a:t>  - `else:`</a:t>
-            </a:r>
-          </a:p>
-          <a:p>
-            <a:pPr/>
-            <a:r>
-              <a:t>  - `    # code if no conditions met`</a:t>
-            </a:r>
-          </a:p>
-          <a:p>
-            <a:pPr/>
-            <a:r>
-              <a:t>**Concept: Indentation**: Remember, indentation defines the code blocks for `if`, `elif`, `else`.</a:t>
-            </a:r>
-          </a:p>
-          <a:p>
-            <a:pPr/>
-            <a:r>
-              <a:t>**Real-life Example**: An ATM program deciding to dispense cash (`if sufficient_funds`), show error (`else`), or a grading system (A, B, C, etc. using `elif`).</a:t>
+              <a:t>3. Normalization/Standardization:</a:t>
+            </a:r>
+          </a:p>
+          <a:p>
+            <a:pPr/>
+            <a:r>
+              <a:t>   - Theory: Adjusting pixel intensity values to a common range (e.g., 0-1 or -1 to 1).</a:t>
+            </a:r>
+          </a:p>
+          <a:p>
+            <a:pPr/>
+            <a:r>
+              <a:t>   - Application: Helps Deep Learning models converge faster and perform better by ensuring all features contribute equally.</a:t>
+            </a:r>
+          </a:p>
+          <a:p>
+            <a:pPr/>
+            <a:r>
+              <a:t>   - Real-Life Example: Scaling pixel values from 0-255 to 0-1 before feeding them into a convolutional neural network.</a:t>
+            </a:r>
+          </a:p>
+          <a:p>
+            <a:pPr/>
+            <a:r>
+              <a:t>4. Noise Reduction (Smoothing/Blurring):</a:t>
+            </a:r>
+          </a:p>
+          <a:p>
+            <a:pPr/>
+            <a:r>
+              <a:t>   - Theory: Applying filters to reduce random variations (noise) in pixel intensities.</a:t>
+            </a:r>
+          </a:p>
+          <a:p>
+            <a:pPr/>
+            <a:r>
+              <a:t>   - Application: Improves image clarity, helps models focus on genuine features rather than spurious noise.</a:t>
+            </a:r>
+          </a:p>
+          <a:p>
+            <a:pPr/>
+            <a:r>
+              <a:t>   - Real-Life Example: Using a Gaussian blur to smooth out sensor noise in a photograph, making objects easier to identify.</a:t>
             </a:r>
           </a:p>
         </p:txBody>
@@ -4327,7 +3839,7 @@
           <a:lstStyle/>
           <a:p>
             <a:r>
-              <a:t>Control Flow - Loops: Repeating Actions</a:t>
+              <a:t>Image Augmentation: Expanding Your Dataset for Deep Learning</a:t>
             </a:r>
           </a:p>
         </p:txBody>
@@ -4348,85 +3860,55 @@
           <a:lstStyle/>
           <a:p>
             <a:r>
-              <a:t>**Loops**: Allow a block of code to be executed repeatedly.</a:t>
-            </a:r>
-          </a:p>
-          <a:p>
-            <a:pPr/>
-            <a:r>
-              <a:t>**1. `for` Loop**: Iterates over a sequence (like a list, string, or range of numbers).</a:t>
-            </a:r>
-          </a:p>
-          <a:p>
-            <a:pPr/>
-            <a:r>
-              <a:t>  - **Syntax**: `for item in sequence:`</a:t>
-            </a:r>
-          </a:p>
-          <a:p>
-            <a:pPr/>
-            <a:r>
-              <a:t>  - `    # code to repeat`</a:t>
-            </a:r>
-          </a:p>
-          <a:p>
-            <a:pPr/>
-            <a:r>
-              <a:t>  - **`range()` function**: Often used with `for` loops to generate a sequence of numbers (e.g., `range(5)` for 0,1,2,3,4).</a:t>
-            </a:r>
-          </a:p>
-          <a:p>
-            <a:pPr/>
-            <a:r>
-              <a:t>  - **Real-life Example**: Processing each item in a shopping cart, performing an action for each student in a class.</a:t>
-            </a:r>
-          </a:p>
-          <a:p>
-            <a:pPr/>
-            <a:r>
-              <a:t>**2. `while` Loop**: Repeats a block of code as long as a condition remains `True`.</a:t>
-            </a:r>
-          </a:p>
-          <a:p>
-            <a:pPr/>
-            <a:r>
-              <a:t>  - **Syntax**: `while condition:`</a:t>
-            </a:r>
-          </a:p>
-          <a:p>
-            <a:pPr/>
-            <a:r>
-              <a:t>  - `    # code to repeat`</a:t>
-            </a:r>
-          </a:p>
-          <a:p>
-            <a:pPr/>
-            <a:r>
-              <a:t>  - **Important**: Ensure the condition eventually becomes `False` to avoid infinite loops!</a:t>
-            </a:r>
-          </a:p>
-          <a:p>
-            <a:pPr/>
-            <a:r>
-              <a:t>  - **Real-life Example**: A game loop that continues until the player quits, waiting for valid user input.</a:t>
-            </a:r>
-          </a:p>
-          <a:p>
-            <a:pPr/>
-            <a:r>
-              <a:t>**Loop Control Statements**: Modify loop behavior.</a:t>
-            </a:r>
-          </a:p>
-          <a:p>
-            <a:pPr/>
-            <a:r>
-              <a:t>  - `break`: Terminates the loop entirely.</a:t>
-            </a:r>
-          </a:p>
-          <a:p>
-            <a:pPr/>
-            <a:r>
-              <a:t>  - `continue`: Skips the rest of the current iteration and moves to the next.</a:t>
+              <a:t>What is Image Augmentation? – Artificially creating new training data from existing images by applying various transformations.</a:t>
+            </a:r>
+          </a:p>
+          <a:p>
+            <a:pPr/>
+            <a:r>
+              <a:t>Why is it Used? – Deep Learning models need vast amounts of data. Augmentation helps prevent overfitting and improves model generalization to unseen data.</a:t>
+            </a:r>
+          </a:p>
+          <a:p>
+            <a:pPr/>
+            <a:r>
+              <a:t>Common Techniques:</a:t>
+            </a:r>
+          </a:p>
+          <a:p>
+            <a:pPr/>
+            <a:r>
+              <a:t>   - Flipping: Mirroring an image horizontally or vertically.</a:t>
+            </a:r>
+          </a:p>
+          <a:p>
+            <a:pPr/>
+            <a:r>
+              <a:t>   - Rotation: Rotating the image by a certain degree.</a:t>
+            </a:r>
+          </a:p>
+          <a:p>
+            <a:pPr/>
+            <a:r>
+              <a:t>   - Cropping: Taking a smaller section of the image.</a:t>
+            </a:r>
+          </a:p>
+          <a:p>
+            <a:pPr/>
+            <a:r>
+              <a:t>   - Translation: Shifting the image horizontally or vertically.</a:t>
+            </a:r>
+          </a:p>
+          <a:p>
+            <a:pPr/>
+            <a:r>
+              <a:t>   - Brightness/Contrast Adjustment: Altering the overall light and dark levels.</a:t>
+            </a:r>
+          </a:p>
+          <a:p>
+            <a:pPr/>
+            <a:r>
+              <a:t>Real-Life Example: Training a model to recognize a cat, you can flip, rotate, and crop existing cat images to create many variations from just one original.</a:t>
             </a:r>
           </a:p>
         </p:txBody>
@@ -4465,7 +3947,7 @@
           <a:lstStyle/>
           <a:p>
             <a:r>
-              <a:t>Introduction to Data Structures: Organizing Your Data</a:t>
+              <a:t>Preprocessing in Action: Real-Life Scenarios</a:t>
             </a:r>
           </a:p>
         </p:txBody>
@@ -4486,91 +3968,55 @@
           <a:lstStyle/>
           <a:p>
             <a:r>
-              <a:t>**Data Structures**: Ways to organize and store data efficiently.</a:t>
-            </a:r>
-          </a:p>
-          <a:p>
-            <a:pPr/>
-            <a:r>
-              <a:t>**1. Lists (`list`)**: Ordered, mutable (changeable) collections of items.</a:t>
-            </a:r>
-          </a:p>
-          <a:p>
-            <a:pPr/>
-            <a:r>
-              <a:t>  - **Creation**: `my_list = [1, 'hello', 3.14]`</a:t>
-            </a:r>
-          </a:p>
-          <a:p>
-            <a:pPr/>
-            <a:r>
-              <a:t>  - **Accessing**: `my_list[0]` (indexing starts at 0), `my_list[-1]` (last element).</a:t>
-            </a:r>
-          </a:p>
-          <a:p>
-            <a:pPr/>
-            <a:r>
-              <a:t>  - **Operations**: `append()` (add item to end), `remove()` (remove specific item), `len()` (length).</a:t>
-            </a:r>
-          </a:p>
-          <a:p>
-            <a:pPr/>
-            <a:r>
-              <a:t>  - **Real-life Example**: A list of student names, items in an inventory, a shopping cart.</a:t>
-            </a:r>
-          </a:p>
-          <a:p>
-            <a:pPr/>
-            <a:r>
-              <a:t>**2. Tuples (`tuple`)**: Ordered, immutable (unchangeable) collections of items.</a:t>
-            </a:r>
-          </a:p>
-          <a:p>
-            <a:pPr/>
-            <a:r>
-              <a:t>  - **Creation**: `my_tuple = (1, 'world', 2.71)`</a:t>
-            </a:r>
-          </a:p>
-          <a:p>
-            <a:pPr/>
-            <a:r>
-              <a:t>  - **Accessing**: Similar to lists (`my_tuple[0]`).</a:t>
-            </a:r>
-          </a:p>
-          <a:p>
-            <a:pPr/>
-            <a:r>
-              <a:t>  - **Immutability**: Once created, you cannot add, remove, or change elements.</a:t>
-            </a:r>
-          </a:p>
-          <a:p>
-            <a:pPr/>
-            <a:r>
-              <a:t>  - **Real-life Example**: Storing geographical coordinates (latitude, longitude) or RGB color values that shouldn't change.</a:t>
-            </a:r>
-          </a:p>
-          <a:p>
-            <a:pPr/>
-            <a:r>
-              <a:t>**3. Strings (`str`)**: Ordered, immutable sequence of characters.</a:t>
-            </a:r>
-          </a:p>
-          <a:p>
-            <a:pPr/>
-            <a:r>
-              <a:t>  - **Creation**: `'Hello'`, `"Python"`</a:t>
-            </a:r>
-          </a:p>
-          <a:p>
-            <a:pPr/>
-            <a:r>
-              <a:t>  - **Operations**: Concatenation (`+`), Slicing (`'Python'[1:4]` -&gt; `'yth'`), `len()`, methods like `upper()`, `lower()`, `strip()`, `replace()`.</a:t>
-            </a:r>
-          </a:p>
-          <a:p>
-            <a:pPr/>
-            <a:r>
-              <a:t>  - **Real-life Example**: Handling user input, formatting text, searching for patterns in documents.</a:t>
+              <a:t>Scenario 1: Autonomous Driving</a:t>
+            </a:r>
+          </a:p>
+          <a:p>
+            <a:pPr/>
+            <a:r>
+              <a:t>   - Task: Detecting pedestrians and traffic signs.</a:t>
+            </a:r>
+          </a:p>
+          <a:p>
+            <a:pPr/>
+            <a:r>
+              <a:t>   - Preprocessing: Resizing camera frames to a standard input size, normalizing pixel values, applying noise reduction to handle varying weather/light conditions.</a:t>
+            </a:r>
+          </a:p>
+          <a:p>
+            <a:pPr/>
+            <a:r>
+              <a:t>Scenario 2: Medical Diagnosis (e.g., X-ray analysis)</a:t>
+            </a:r>
+          </a:p>
+          <a:p>
+            <a:pPr/>
+            <a:r>
+              <a:t>   - Task: Identifying anomalies in X-ray images.</a:t>
+            </a:r>
+          </a:p>
+          <a:p>
+            <a:pPr/>
+            <a:r>
+              <a:t>   - Preprocessing: Grayscale conversion (if not already), contrast enhancement to highlight subtle differences, noise reduction to clean up image artifacts.</a:t>
+            </a:r>
+          </a:p>
+          <a:p>
+            <a:pPr/>
+            <a:r>
+              <a:t>Scenario 3: Facial Recognition</a:t>
+            </a:r>
+          </a:p>
+          <a:p>
+            <a:pPr/>
+            <a:r>
+              <a:t>   - Task: Identifying a person from a photo.</a:t>
+            </a:r>
+          </a:p>
+          <a:p>
+            <a:pPr/>
+            <a:r>
+              <a:t>   - Preprocessing: Cropping to focus on the face, resizing to a standard dimension, normalizing pixel values for consistent input to the model.</a:t>
             </a:r>
           </a:p>
         </p:txBody>

</xml_diff>